<commit_message>
Updated first few slides of Presentation
</commit_message>
<xml_diff>
--- a/Presentation/Presentation_FINAL_DRAFT.pptx
+++ b/Presentation/Presentation_FINAL_DRAFT.pptx
@@ -5,41 +5,59 @@
     <p:sldMasterId id="2147483662" r:id="rId1"/>
   </p:sldMasterIdLst>
   <p:notesMasterIdLst>
-    <p:notesMasterId r:id="rId5"/>
+    <p:notesMasterId r:id="rId16"/>
   </p:notesMasterIdLst>
   <p:sldIdLst>
     <p:sldId id="256" r:id="rId2"/>
-    <p:sldId id="257" r:id="rId3"/>
-    <p:sldId id="258" r:id="rId4"/>
+    <p:sldId id="260" r:id="rId3"/>
+    <p:sldId id="261" r:id="rId4"/>
+    <p:sldId id="271" r:id="rId5"/>
+    <p:sldId id="272" r:id="rId6"/>
+    <p:sldId id="273" r:id="rId7"/>
+    <p:sldId id="274" r:id="rId8"/>
+    <p:sldId id="266" r:id="rId9"/>
+    <p:sldId id="267" r:id="rId10"/>
+    <p:sldId id="268" r:id="rId11"/>
+    <p:sldId id="269" r:id="rId12"/>
+    <p:sldId id="270" r:id="rId13"/>
+    <p:sldId id="258" r:id="rId14"/>
+    <p:sldId id="259" r:id="rId15"/>
   </p:sldIdLst>
   <p:sldSz cx="9144000" cy="5143500" type="screen16x9"/>
   <p:notesSz cx="6858000" cy="9144000"/>
   <p:embeddedFontLst>
     <p:embeddedFont>
+      <p:font typeface="Times" panose="02020603050405020304" pitchFamily="18" charset="0"/>
+      <p:regular r:id="rId17"/>
+      <p:bold r:id="rId18"/>
+      <p:italic r:id="rId19"/>
+      <p:boldItalic r:id="rId20"/>
+    </p:embeddedFont>
+    <p:embeddedFont>
+      <p:font typeface="Calibri Light" panose="020F0302020204030204" pitchFamily="34" charset="0"/>
+      <p:regular r:id="rId21"/>
+      <p:italic r:id="rId22"/>
+    </p:embeddedFont>
+    <p:embeddedFont>
       <p:font typeface="Montserrat Medium" panose="020B0604020202020204" charset="0"/>
-      <p:regular r:id="rId6"/>
-      <p:bold r:id="rId7"/>
-      <p:italic r:id="rId8"/>
-      <p:boldItalic r:id="rId9"/>
+      <p:regular r:id="rId23"/>
+      <p:bold r:id="rId24"/>
+      <p:italic r:id="rId25"/>
+      <p:boldItalic r:id="rId26"/>
+    </p:embeddedFont>
+    <p:embeddedFont>
+      <p:font typeface="Montserrat" panose="020B0604020202020204" charset="0"/>
+      <p:regular r:id="rId27"/>
+      <p:bold r:id="rId28"/>
+      <p:italic r:id="rId29"/>
+      <p:boldItalic r:id="rId30"/>
     </p:embeddedFont>
     <p:embeddedFont>
       <p:font typeface="Calibri" panose="020F0502020204030204" pitchFamily="34" charset="0"/>
-      <p:regular r:id="rId10"/>
-      <p:bold r:id="rId11"/>
-      <p:italic r:id="rId12"/>
-      <p:boldItalic r:id="rId13"/>
-    </p:embeddedFont>
-    <p:embeddedFont>
-      <p:font typeface="Montserrat" panose="020B0604020202020204" charset="0"/>
-      <p:regular r:id="rId14"/>
-      <p:bold r:id="rId15"/>
-      <p:italic r:id="rId16"/>
-      <p:boldItalic r:id="rId17"/>
-    </p:embeddedFont>
-    <p:embeddedFont>
-      <p:font typeface="Calibri Light" panose="020F0302020204030204" pitchFamily="34" charset="0"/>
-      <p:regular r:id="rId18"/>
-      <p:italic r:id="rId19"/>
+      <p:regular r:id="rId31"/>
+      <p:bold r:id="rId32"/>
+      <p:italic r:id="rId33"/>
+      <p:boldItalic r:id="rId34"/>
     </p:embeddedFont>
   </p:embeddedFontLst>
   <p:defaultTextStyle>
@@ -272,8 +290,11 @@
     </a:lvl9pPr>
   </p:defaultTextStyle>
   <p:extLst>
+    <p:ext uri="{EFAFB233-063F-42B5-8137-9DF3F51BA10A}">
+      <p15:sldGuideLst xmlns:p15="http://schemas.microsoft.com/office/powerpoint/2012/main"/>
+    </p:ext>
     <p:ext uri="GoogleSlidesCustomDataVersion2">
-      <go:slidesCustomData xmlns:go="http://customooxmlschemas.google.com/" xmlns:ahyp="http://schemas.microsoft.com/office/drawing/2018/hyperlinkcolor" xmlns:p15="http://schemas.microsoft.com/office/powerpoint/2012/main" xmlns:p14="http://schemas.microsoft.com/office/powerpoint/2010/main" xmlns:com="http://schemas.openxmlformats.org/drawingml/2006/compatibility" xmlns:pvml="urn:schemas-microsoft-com:office:powerpoint" xmlns:v="urn:schemas-microsoft-com:vml" xmlns:o="urn:schemas-microsoft-com:office:office" xmlns:dgm="http://schemas.openxmlformats.org/drawingml/2006/diagram" xmlns:c="http://schemas.openxmlformats.org/drawingml/2006/chart" xmlns:mv="urn:schemas-microsoft-com:mac:vml" xmlns:mc="http://schemas.openxmlformats.org/markup-compatibility/2006" xmlns="" r:id="rId31" roundtripDataSignature="AMtx7mhgpbhf3U/UBlUGG60SKwoBnxqdfw=="/>
+      <go:slidesCustomData xmlns="" xmlns:mc="http://schemas.openxmlformats.org/markup-compatibility/2006" xmlns:mv="urn:schemas-microsoft-com:mac:vml" xmlns:c="http://schemas.openxmlformats.org/drawingml/2006/chart" xmlns:dgm="http://schemas.openxmlformats.org/drawingml/2006/diagram" xmlns:o="urn:schemas-microsoft-com:office:office" xmlns:v="urn:schemas-microsoft-com:vml" xmlns:pvml="urn:schemas-microsoft-com:office:powerpoint" xmlns:com="http://schemas.openxmlformats.org/drawingml/2006/compatibility" xmlns:p14="http://schemas.microsoft.com/office/powerpoint/2010/main" xmlns:p15="http://schemas.microsoft.com/office/powerpoint/2012/main" xmlns:ahyp="http://schemas.microsoft.com/office/drawing/2018/hyperlinkcolor" xmlns:go="http://customooxmlschemas.google.com/" r:id="rId35" roundtripDataSignature="AMtx7mhgpbhf3U/UBlUGG60SKwoBnxqdfw=="/>
     </p:ext>
   </p:extLst>
 </p:presentation>
@@ -981,6 +1002,1205 @@
     <p:extLst>
       <p:ext uri="{BB962C8B-B14F-4D97-AF65-F5344CB8AC3E}">
         <p14:creationId xmlns:p14="http://schemas.microsoft.com/office/powerpoint/2010/main" val="279427986"/>
+      </p:ext>
+    </p:extLst>
+  </p:cSld>
+  <p:clrMapOvr>
+    <a:masterClrMapping/>
+  </p:clrMapOvr>
+</p:notes>
+</file>
+
+<file path=ppt/notesSlides/notesSlide10.xml><?xml version="1.0" encoding="utf-8"?>
+<p:notes xmlns:a="http://schemas.openxmlformats.org/drawingml/2006/main" xmlns:r="http://schemas.openxmlformats.org/officeDocument/2006/relationships" xmlns:p="http://schemas.openxmlformats.org/presentationml/2006/main" showMasterSp="0" showMasterPhAnim="0">
+  <p:cSld>
+    <p:spTree>
+      <p:nvGrpSpPr>
+        <p:cNvPr id="1" name="Shape 186"/>
+        <p:cNvGrpSpPr/>
+        <p:nvPr/>
+      </p:nvGrpSpPr>
+      <p:grpSpPr>
+        <a:xfrm>
+          <a:off x="0" y="0"/>
+          <a:ext cx="0" cy="0"/>
+          <a:chOff x="0" y="0"/>
+          <a:chExt cx="0" cy="0"/>
+        </a:xfrm>
+      </p:grpSpPr>
+      <p:sp>
+        <p:nvSpPr>
+          <p:cNvPr id="187" name="Google Shape;187;p11:notes"/>
+          <p:cNvSpPr txBox="1">
+            <a:spLocks noGrp="1"/>
+          </p:cNvSpPr>
+          <p:nvPr>
+            <p:ph type="body" idx="1"/>
+          </p:nvPr>
+        </p:nvSpPr>
+        <p:spPr>
+          <a:xfrm>
+            <a:off x="685800" y="4343400"/>
+            <a:ext cx="5486400" cy="4114800"/>
+          </a:xfrm>
+          <a:prstGeom prst="rect">
+            <a:avLst/>
+          </a:prstGeom>
+        </p:spPr>
+        <p:txBody>
+          <a:bodyPr spcFirstLastPara="1" wrap="square" lIns="91425" tIns="45700" rIns="91425" bIns="45700" anchor="t" anchorCtr="0">
+            <a:noAutofit/>
+          </a:bodyPr>
+          <a:lstStyle/>
+          <a:p>
+            <a:pPr marL="0" lvl="0" indent="0" algn="l" rtl="0">
+              <a:spcBef>
+                <a:spcPts val="0"/>
+              </a:spcBef>
+              <a:spcAft>
+                <a:spcPts val="0"/>
+              </a:spcAft>
+              <a:buNone/>
+            </a:pPr>
+            <a:endParaRPr/>
+          </a:p>
+        </p:txBody>
+      </p:sp>
+      <p:sp>
+        <p:nvSpPr>
+          <p:cNvPr id="188" name="Google Shape;188;p11:notes"/>
+          <p:cNvSpPr>
+            <a:spLocks noGrp="1" noRot="1" noChangeAspect="1"/>
+          </p:cNvSpPr>
+          <p:nvPr>
+            <p:ph type="sldImg" idx="2"/>
+          </p:nvPr>
+        </p:nvSpPr>
+        <p:spPr>
+          <a:xfrm>
+            <a:off x="381000" y="685800"/>
+            <a:ext cx="6096000" cy="3429000"/>
+          </a:xfrm>
+          <a:custGeom>
+            <a:avLst/>
+            <a:gdLst/>
+            <a:ahLst/>
+            <a:cxnLst/>
+            <a:rect l="l" t="t" r="r" b="b"/>
+            <a:pathLst>
+              <a:path w="120000" h="120000" extrusionOk="0">
+                <a:moveTo>
+                  <a:pt x="0" y="0"/>
+                </a:moveTo>
+                <a:lnTo>
+                  <a:pt x="120000" y="0"/>
+                </a:lnTo>
+                <a:lnTo>
+                  <a:pt x="120000" y="120000"/>
+                </a:lnTo>
+                <a:lnTo>
+                  <a:pt x="0" y="120000"/>
+                </a:lnTo>
+                <a:close/>
+              </a:path>
+            </a:pathLst>
+          </a:custGeom>
+        </p:spPr>
+      </p:sp>
+    </p:spTree>
+    <p:extLst>
+      <p:ext uri="{BB962C8B-B14F-4D97-AF65-F5344CB8AC3E}">
+        <p14:creationId xmlns:p14="http://schemas.microsoft.com/office/powerpoint/2010/main" val="3799466928"/>
+      </p:ext>
+    </p:extLst>
+  </p:cSld>
+  <p:clrMapOvr>
+    <a:masterClrMapping/>
+  </p:clrMapOvr>
+</p:notes>
+</file>
+
+<file path=ppt/notesSlides/notesSlide11.xml><?xml version="1.0" encoding="utf-8"?>
+<p:notes xmlns:a="http://schemas.openxmlformats.org/drawingml/2006/main" xmlns:r="http://schemas.openxmlformats.org/officeDocument/2006/relationships" xmlns:p="http://schemas.openxmlformats.org/presentationml/2006/main" showMasterSp="0" showMasterPhAnim="0">
+  <p:cSld>
+    <p:spTree>
+      <p:nvGrpSpPr>
+        <p:cNvPr id="1" name="Shape 186"/>
+        <p:cNvGrpSpPr/>
+        <p:nvPr/>
+      </p:nvGrpSpPr>
+      <p:grpSpPr>
+        <a:xfrm>
+          <a:off x="0" y="0"/>
+          <a:ext cx="0" cy="0"/>
+          <a:chOff x="0" y="0"/>
+          <a:chExt cx="0" cy="0"/>
+        </a:xfrm>
+      </p:grpSpPr>
+      <p:sp>
+        <p:nvSpPr>
+          <p:cNvPr id="187" name="Google Shape;187;p11:notes"/>
+          <p:cNvSpPr txBox="1">
+            <a:spLocks noGrp="1"/>
+          </p:cNvSpPr>
+          <p:nvPr>
+            <p:ph type="body" idx="1"/>
+          </p:nvPr>
+        </p:nvSpPr>
+        <p:spPr>
+          <a:xfrm>
+            <a:off x="685800" y="4343400"/>
+            <a:ext cx="5486400" cy="4114800"/>
+          </a:xfrm>
+          <a:prstGeom prst="rect">
+            <a:avLst/>
+          </a:prstGeom>
+        </p:spPr>
+        <p:txBody>
+          <a:bodyPr spcFirstLastPara="1" wrap="square" lIns="91425" tIns="45700" rIns="91425" bIns="45700" anchor="t" anchorCtr="0">
+            <a:noAutofit/>
+          </a:bodyPr>
+          <a:lstStyle/>
+          <a:p>
+            <a:pPr marL="0" lvl="0" indent="0" algn="l" rtl="0">
+              <a:spcBef>
+                <a:spcPts val="0"/>
+              </a:spcBef>
+              <a:spcAft>
+                <a:spcPts val="0"/>
+              </a:spcAft>
+              <a:buNone/>
+            </a:pPr>
+            <a:endParaRPr/>
+          </a:p>
+        </p:txBody>
+      </p:sp>
+      <p:sp>
+        <p:nvSpPr>
+          <p:cNvPr id="188" name="Google Shape;188;p11:notes"/>
+          <p:cNvSpPr>
+            <a:spLocks noGrp="1" noRot="1" noChangeAspect="1"/>
+          </p:cNvSpPr>
+          <p:nvPr>
+            <p:ph type="sldImg" idx="2"/>
+          </p:nvPr>
+        </p:nvSpPr>
+        <p:spPr>
+          <a:xfrm>
+            <a:off x="381000" y="685800"/>
+            <a:ext cx="6096000" cy="3429000"/>
+          </a:xfrm>
+          <a:custGeom>
+            <a:avLst/>
+            <a:gdLst/>
+            <a:ahLst/>
+            <a:cxnLst/>
+            <a:rect l="l" t="t" r="r" b="b"/>
+            <a:pathLst>
+              <a:path w="120000" h="120000" extrusionOk="0">
+                <a:moveTo>
+                  <a:pt x="0" y="0"/>
+                </a:moveTo>
+                <a:lnTo>
+                  <a:pt x="120000" y="0"/>
+                </a:lnTo>
+                <a:lnTo>
+                  <a:pt x="120000" y="120000"/>
+                </a:lnTo>
+                <a:lnTo>
+                  <a:pt x="0" y="120000"/>
+                </a:lnTo>
+                <a:close/>
+              </a:path>
+            </a:pathLst>
+          </a:custGeom>
+        </p:spPr>
+      </p:sp>
+    </p:spTree>
+    <p:extLst>
+      <p:ext uri="{BB962C8B-B14F-4D97-AF65-F5344CB8AC3E}">
+        <p14:creationId xmlns:p14="http://schemas.microsoft.com/office/powerpoint/2010/main" val="1302646025"/>
+      </p:ext>
+    </p:extLst>
+  </p:cSld>
+  <p:clrMapOvr>
+    <a:masterClrMapping/>
+  </p:clrMapOvr>
+</p:notes>
+</file>
+
+<file path=ppt/notesSlides/notesSlide12.xml><?xml version="1.0" encoding="utf-8"?>
+<p:notes xmlns:a="http://schemas.openxmlformats.org/drawingml/2006/main" xmlns:r="http://schemas.openxmlformats.org/officeDocument/2006/relationships" xmlns:p="http://schemas.openxmlformats.org/presentationml/2006/main" showMasterSp="0" showMasterPhAnim="0">
+  <p:cSld>
+    <p:spTree>
+      <p:nvGrpSpPr>
+        <p:cNvPr id="1" name="Shape 196"/>
+        <p:cNvGrpSpPr/>
+        <p:nvPr/>
+      </p:nvGrpSpPr>
+      <p:grpSpPr>
+        <a:xfrm>
+          <a:off x="0" y="0"/>
+          <a:ext cx="0" cy="0"/>
+          <a:chOff x="0" y="0"/>
+          <a:chExt cx="0" cy="0"/>
+        </a:xfrm>
+      </p:grpSpPr>
+      <p:sp>
+        <p:nvSpPr>
+          <p:cNvPr id="197" name="Google Shape;197;p12:notes"/>
+          <p:cNvSpPr txBox="1">
+            <a:spLocks noGrp="1"/>
+          </p:cNvSpPr>
+          <p:nvPr>
+            <p:ph type="body" idx="1"/>
+          </p:nvPr>
+        </p:nvSpPr>
+        <p:spPr>
+          <a:xfrm>
+            <a:off x="685800" y="4343400"/>
+            <a:ext cx="5486400" cy="4114800"/>
+          </a:xfrm>
+          <a:prstGeom prst="rect">
+            <a:avLst/>
+          </a:prstGeom>
+        </p:spPr>
+        <p:txBody>
+          <a:bodyPr spcFirstLastPara="1" wrap="square" lIns="91425" tIns="45700" rIns="91425" bIns="45700" anchor="t" anchorCtr="0">
+            <a:noAutofit/>
+          </a:bodyPr>
+          <a:lstStyle/>
+          <a:p>
+            <a:pPr marL="0" lvl="0" indent="0" algn="l" rtl="0">
+              <a:spcBef>
+                <a:spcPts val="0"/>
+              </a:spcBef>
+              <a:spcAft>
+                <a:spcPts val="0"/>
+              </a:spcAft>
+              <a:buNone/>
+            </a:pPr>
+            <a:endParaRPr/>
+          </a:p>
+        </p:txBody>
+      </p:sp>
+      <p:sp>
+        <p:nvSpPr>
+          <p:cNvPr id="198" name="Google Shape;198;p12:notes"/>
+          <p:cNvSpPr>
+            <a:spLocks noGrp="1" noRot="1" noChangeAspect="1"/>
+          </p:cNvSpPr>
+          <p:nvPr>
+            <p:ph type="sldImg" idx="2"/>
+          </p:nvPr>
+        </p:nvSpPr>
+        <p:spPr>
+          <a:xfrm>
+            <a:off x="381000" y="685800"/>
+            <a:ext cx="6096000" cy="3429000"/>
+          </a:xfrm>
+          <a:custGeom>
+            <a:avLst/>
+            <a:gdLst/>
+            <a:ahLst/>
+            <a:cxnLst/>
+            <a:rect l="l" t="t" r="r" b="b"/>
+            <a:pathLst>
+              <a:path w="120000" h="120000" extrusionOk="0">
+                <a:moveTo>
+                  <a:pt x="0" y="0"/>
+                </a:moveTo>
+                <a:lnTo>
+                  <a:pt x="120000" y="0"/>
+                </a:lnTo>
+                <a:lnTo>
+                  <a:pt x="120000" y="120000"/>
+                </a:lnTo>
+                <a:lnTo>
+                  <a:pt x="0" y="120000"/>
+                </a:lnTo>
+                <a:close/>
+              </a:path>
+            </a:pathLst>
+          </a:custGeom>
+        </p:spPr>
+      </p:sp>
+    </p:spTree>
+    <p:extLst>
+      <p:ext uri="{BB962C8B-B14F-4D97-AF65-F5344CB8AC3E}">
+        <p14:creationId xmlns:p14="http://schemas.microsoft.com/office/powerpoint/2010/main" val="1642130835"/>
+      </p:ext>
+    </p:extLst>
+  </p:cSld>
+  <p:clrMapOvr>
+    <a:masterClrMapping/>
+  </p:clrMapOvr>
+</p:notes>
+</file>
+
+<file path=ppt/notesSlides/notesSlide2.xml><?xml version="1.0" encoding="utf-8"?>
+<p:notes xmlns:a="http://schemas.openxmlformats.org/drawingml/2006/main" xmlns:r="http://schemas.openxmlformats.org/officeDocument/2006/relationships" xmlns:p="http://schemas.openxmlformats.org/presentationml/2006/main" showMasterSp="0" showMasterPhAnim="0">
+  <p:cSld>
+    <p:spTree>
+      <p:nvGrpSpPr>
+        <p:cNvPr id="1" name="Shape 95"/>
+        <p:cNvGrpSpPr/>
+        <p:nvPr/>
+      </p:nvGrpSpPr>
+      <p:grpSpPr>
+        <a:xfrm>
+          <a:off x="0" y="0"/>
+          <a:ext cx="0" cy="0"/>
+          <a:chOff x="0" y="0"/>
+          <a:chExt cx="0" cy="0"/>
+        </a:xfrm>
+      </p:grpSpPr>
+      <p:sp>
+        <p:nvSpPr>
+          <p:cNvPr id="96" name="Google Shape;96;p2:notes"/>
+          <p:cNvSpPr txBox="1">
+            <a:spLocks noGrp="1"/>
+          </p:cNvSpPr>
+          <p:nvPr>
+            <p:ph type="body" idx="1"/>
+          </p:nvPr>
+        </p:nvSpPr>
+        <p:spPr>
+          <a:xfrm>
+            <a:off x="685800" y="4343400"/>
+            <a:ext cx="5486400" cy="4114800"/>
+          </a:xfrm>
+          <a:prstGeom prst="rect">
+            <a:avLst/>
+          </a:prstGeom>
+        </p:spPr>
+        <p:txBody>
+          <a:bodyPr spcFirstLastPara="1" wrap="square" lIns="91425" tIns="45700" rIns="91425" bIns="45700" anchor="t" anchorCtr="0">
+            <a:noAutofit/>
+          </a:bodyPr>
+          <a:lstStyle/>
+          <a:p>
+            <a:pPr marL="0" lvl="0" indent="0" algn="l" rtl="0">
+              <a:spcBef>
+                <a:spcPts val="0"/>
+              </a:spcBef>
+              <a:spcAft>
+                <a:spcPts val="0"/>
+              </a:spcAft>
+              <a:buNone/>
+            </a:pPr>
+            <a:endParaRPr/>
+          </a:p>
+        </p:txBody>
+      </p:sp>
+      <p:sp>
+        <p:nvSpPr>
+          <p:cNvPr id="97" name="Google Shape;97;p2:notes"/>
+          <p:cNvSpPr>
+            <a:spLocks noGrp="1" noRot="1" noChangeAspect="1"/>
+          </p:cNvSpPr>
+          <p:nvPr>
+            <p:ph type="sldImg" idx="2"/>
+          </p:nvPr>
+        </p:nvSpPr>
+        <p:spPr>
+          <a:xfrm>
+            <a:off x="381000" y="685800"/>
+            <a:ext cx="6096000" cy="3429000"/>
+          </a:xfrm>
+          <a:custGeom>
+            <a:avLst/>
+            <a:gdLst/>
+            <a:ahLst/>
+            <a:cxnLst/>
+            <a:rect l="l" t="t" r="r" b="b"/>
+            <a:pathLst>
+              <a:path w="120000" h="120000" extrusionOk="0">
+                <a:moveTo>
+                  <a:pt x="0" y="0"/>
+                </a:moveTo>
+                <a:lnTo>
+                  <a:pt x="120000" y="0"/>
+                </a:lnTo>
+                <a:lnTo>
+                  <a:pt x="120000" y="120000"/>
+                </a:lnTo>
+                <a:lnTo>
+                  <a:pt x="0" y="120000"/>
+                </a:lnTo>
+                <a:close/>
+              </a:path>
+            </a:pathLst>
+          </a:custGeom>
+        </p:spPr>
+      </p:sp>
+    </p:spTree>
+    <p:extLst>
+      <p:ext uri="{BB962C8B-B14F-4D97-AF65-F5344CB8AC3E}">
+        <p14:creationId xmlns:p14="http://schemas.microsoft.com/office/powerpoint/2010/main" val="1268853900"/>
+      </p:ext>
+    </p:extLst>
+  </p:cSld>
+  <p:clrMapOvr>
+    <a:masterClrMapping/>
+  </p:clrMapOvr>
+</p:notes>
+</file>
+
+<file path=ppt/notesSlides/notesSlide3.xml><?xml version="1.0" encoding="utf-8"?>
+<p:notes xmlns:a="http://schemas.openxmlformats.org/drawingml/2006/main" xmlns:r="http://schemas.openxmlformats.org/officeDocument/2006/relationships" xmlns:p="http://schemas.openxmlformats.org/presentationml/2006/main" showMasterSp="0" showMasterPhAnim="0">
+  <p:cSld>
+    <p:spTree>
+      <p:nvGrpSpPr>
+        <p:cNvPr id="1" name="Shape 105"/>
+        <p:cNvGrpSpPr/>
+        <p:nvPr/>
+      </p:nvGrpSpPr>
+      <p:grpSpPr>
+        <a:xfrm>
+          <a:off x="0" y="0"/>
+          <a:ext cx="0" cy="0"/>
+          <a:chOff x="0" y="0"/>
+          <a:chExt cx="0" cy="0"/>
+        </a:xfrm>
+      </p:grpSpPr>
+      <p:sp>
+        <p:nvSpPr>
+          <p:cNvPr id="106" name="Google Shape;106;p3:notes"/>
+          <p:cNvSpPr txBox="1">
+            <a:spLocks noGrp="1"/>
+          </p:cNvSpPr>
+          <p:nvPr>
+            <p:ph type="body" idx="1"/>
+          </p:nvPr>
+        </p:nvSpPr>
+        <p:spPr>
+          <a:xfrm>
+            <a:off x="685800" y="4343400"/>
+            <a:ext cx="5486400" cy="4114800"/>
+          </a:xfrm>
+          <a:prstGeom prst="rect">
+            <a:avLst/>
+          </a:prstGeom>
+        </p:spPr>
+        <p:txBody>
+          <a:bodyPr spcFirstLastPara="1" wrap="square" lIns="91425" tIns="45700" rIns="91425" bIns="45700" anchor="t" anchorCtr="0">
+            <a:noAutofit/>
+          </a:bodyPr>
+          <a:lstStyle/>
+          <a:p>
+            <a:pPr marL="0" lvl="0" indent="0" algn="l" rtl="0">
+              <a:spcBef>
+                <a:spcPts val="0"/>
+              </a:spcBef>
+              <a:spcAft>
+                <a:spcPts val="0"/>
+              </a:spcAft>
+              <a:buNone/>
+            </a:pPr>
+            <a:endParaRPr/>
+          </a:p>
+        </p:txBody>
+      </p:sp>
+      <p:sp>
+        <p:nvSpPr>
+          <p:cNvPr id="107" name="Google Shape;107;p3:notes"/>
+          <p:cNvSpPr>
+            <a:spLocks noGrp="1" noRot="1" noChangeAspect="1"/>
+          </p:cNvSpPr>
+          <p:nvPr>
+            <p:ph type="sldImg" idx="2"/>
+          </p:nvPr>
+        </p:nvSpPr>
+        <p:spPr>
+          <a:xfrm>
+            <a:off x="381000" y="685800"/>
+            <a:ext cx="6096000" cy="3429000"/>
+          </a:xfrm>
+          <a:custGeom>
+            <a:avLst/>
+            <a:gdLst/>
+            <a:ahLst/>
+            <a:cxnLst/>
+            <a:rect l="l" t="t" r="r" b="b"/>
+            <a:pathLst>
+              <a:path w="120000" h="120000" extrusionOk="0">
+                <a:moveTo>
+                  <a:pt x="0" y="0"/>
+                </a:moveTo>
+                <a:lnTo>
+                  <a:pt x="120000" y="0"/>
+                </a:lnTo>
+                <a:lnTo>
+                  <a:pt x="120000" y="120000"/>
+                </a:lnTo>
+                <a:lnTo>
+                  <a:pt x="0" y="120000"/>
+                </a:lnTo>
+                <a:close/>
+              </a:path>
+            </a:pathLst>
+          </a:custGeom>
+        </p:spPr>
+      </p:sp>
+    </p:spTree>
+    <p:extLst>
+      <p:ext uri="{BB962C8B-B14F-4D97-AF65-F5344CB8AC3E}">
+        <p14:creationId xmlns:p14="http://schemas.microsoft.com/office/powerpoint/2010/main" val="4025540336"/>
+      </p:ext>
+    </p:extLst>
+  </p:cSld>
+  <p:clrMapOvr>
+    <a:masterClrMapping/>
+  </p:clrMapOvr>
+</p:notes>
+</file>
+
+<file path=ppt/notesSlides/notesSlide4.xml><?xml version="1.0" encoding="utf-8"?>
+<p:notes xmlns:a="http://schemas.openxmlformats.org/drawingml/2006/main" xmlns:r="http://schemas.openxmlformats.org/officeDocument/2006/relationships" xmlns:p="http://schemas.openxmlformats.org/presentationml/2006/main" showMasterSp="0" showMasterPhAnim="0">
+  <p:cSld>
+    <p:spTree>
+      <p:nvGrpSpPr>
+        <p:cNvPr id="1" name="Shape 105"/>
+        <p:cNvGrpSpPr/>
+        <p:nvPr/>
+      </p:nvGrpSpPr>
+      <p:grpSpPr>
+        <a:xfrm>
+          <a:off x="0" y="0"/>
+          <a:ext cx="0" cy="0"/>
+          <a:chOff x="0" y="0"/>
+          <a:chExt cx="0" cy="0"/>
+        </a:xfrm>
+      </p:grpSpPr>
+      <p:sp>
+        <p:nvSpPr>
+          <p:cNvPr id="106" name="Google Shape;106;p3:notes"/>
+          <p:cNvSpPr txBox="1">
+            <a:spLocks noGrp="1"/>
+          </p:cNvSpPr>
+          <p:nvPr>
+            <p:ph type="body" idx="1"/>
+          </p:nvPr>
+        </p:nvSpPr>
+        <p:spPr>
+          <a:xfrm>
+            <a:off x="685800" y="4343400"/>
+            <a:ext cx="5486400" cy="4114800"/>
+          </a:xfrm>
+          <a:prstGeom prst="rect">
+            <a:avLst/>
+          </a:prstGeom>
+        </p:spPr>
+        <p:txBody>
+          <a:bodyPr spcFirstLastPara="1" wrap="square" lIns="91425" tIns="45700" rIns="91425" bIns="45700" anchor="t" anchorCtr="0">
+            <a:noAutofit/>
+          </a:bodyPr>
+          <a:lstStyle/>
+          <a:p>
+            <a:pPr marL="0" lvl="0" indent="0" algn="l" rtl="0">
+              <a:spcBef>
+                <a:spcPts val="0"/>
+              </a:spcBef>
+              <a:spcAft>
+                <a:spcPts val="0"/>
+              </a:spcAft>
+              <a:buNone/>
+            </a:pPr>
+            <a:endParaRPr/>
+          </a:p>
+        </p:txBody>
+      </p:sp>
+      <p:sp>
+        <p:nvSpPr>
+          <p:cNvPr id="107" name="Google Shape;107;p3:notes"/>
+          <p:cNvSpPr>
+            <a:spLocks noGrp="1" noRot="1" noChangeAspect="1"/>
+          </p:cNvSpPr>
+          <p:nvPr>
+            <p:ph type="sldImg" idx="2"/>
+          </p:nvPr>
+        </p:nvSpPr>
+        <p:spPr>
+          <a:xfrm>
+            <a:off x="381000" y="685800"/>
+            <a:ext cx="6096000" cy="3429000"/>
+          </a:xfrm>
+          <a:custGeom>
+            <a:avLst/>
+            <a:gdLst/>
+            <a:ahLst/>
+            <a:cxnLst/>
+            <a:rect l="l" t="t" r="r" b="b"/>
+            <a:pathLst>
+              <a:path w="120000" h="120000" extrusionOk="0">
+                <a:moveTo>
+                  <a:pt x="0" y="0"/>
+                </a:moveTo>
+                <a:lnTo>
+                  <a:pt x="120000" y="0"/>
+                </a:lnTo>
+                <a:lnTo>
+                  <a:pt x="120000" y="120000"/>
+                </a:lnTo>
+                <a:lnTo>
+                  <a:pt x="0" y="120000"/>
+                </a:lnTo>
+                <a:close/>
+              </a:path>
+            </a:pathLst>
+          </a:custGeom>
+        </p:spPr>
+      </p:sp>
+    </p:spTree>
+    <p:extLst>
+      <p:ext uri="{BB962C8B-B14F-4D97-AF65-F5344CB8AC3E}">
+        <p14:creationId xmlns:p14="http://schemas.microsoft.com/office/powerpoint/2010/main" val="3948618302"/>
+      </p:ext>
+    </p:extLst>
+  </p:cSld>
+  <p:clrMapOvr>
+    <a:masterClrMapping/>
+  </p:clrMapOvr>
+</p:notes>
+</file>
+
+<file path=ppt/notesSlides/notesSlide5.xml><?xml version="1.0" encoding="utf-8"?>
+<p:notes xmlns:a="http://schemas.openxmlformats.org/drawingml/2006/main" xmlns:r="http://schemas.openxmlformats.org/officeDocument/2006/relationships" xmlns:p="http://schemas.openxmlformats.org/presentationml/2006/main" showMasterSp="0" showMasterPhAnim="0">
+  <p:cSld>
+    <p:spTree>
+      <p:nvGrpSpPr>
+        <p:cNvPr id="1" name="Shape 105"/>
+        <p:cNvGrpSpPr/>
+        <p:nvPr/>
+      </p:nvGrpSpPr>
+      <p:grpSpPr>
+        <a:xfrm>
+          <a:off x="0" y="0"/>
+          <a:ext cx="0" cy="0"/>
+          <a:chOff x="0" y="0"/>
+          <a:chExt cx="0" cy="0"/>
+        </a:xfrm>
+      </p:grpSpPr>
+      <p:sp>
+        <p:nvSpPr>
+          <p:cNvPr id="106" name="Google Shape;106;p3:notes"/>
+          <p:cNvSpPr txBox="1">
+            <a:spLocks noGrp="1"/>
+          </p:cNvSpPr>
+          <p:nvPr>
+            <p:ph type="body" idx="1"/>
+          </p:nvPr>
+        </p:nvSpPr>
+        <p:spPr>
+          <a:xfrm>
+            <a:off x="685800" y="4343400"/>
+            <a:ext cx="5486400" cy="4114800"/>
+          </a:xfrm>
+          <a:prstGeom prst="rect">
+            <a:avLst/>
+          </a:prstGeom>
+        </p:spPr>
+        <p:txBody>
+          <a:bodyPr spcFirstLastPara="1" wrap="square" lIns="91425" tIns="45700" rIns="91425" bIns="45700" anchor="t" anchorCtr="0">
+            <a:noAutofit/>
+          </a:bodyPr>
+          <a:lstStyle/>
+          <a:p>
+            <a:pPr marL="0" lvl="0" indent="0" algn="l" rtl="0">
+              <a:spcBef>
+                <a:spcPts val="0"/>
+              </a:spcBef>
+              <a:spcAft>
+                <a:spcPts val="0"/>
+              </a:spcAft>
+              <a:buNone/>
+            </a:pPr>
+            <a:endParaRPr/>
+          </a:p>
+        </p:txBody>
+      </p:sp>
+      <p:sp>
+        <p:nvSpPr>
+          <p:cNvPr id="107" name="Google Shape;107;p3:notes"/>
+          <p:cNvSpPr>
+            <a:spLocks noGrp="1" noRot="1" noChangeAspect="1"/>
+          </p:cNvSpPr>
+          <p:nvPr>
+            <p:ph type="sldImg" idx="2"/>
+          </p:nvPr>
+        </p:nvSpPr>
+        <p:spPr>
+          <a:xfrm>
+            <a:off x="381000" y="685800"/>
+            <a:ext cx="6096000" cy="3429000"/>
+          </a:xfrm>
+          <a:custGeom>
+            <a:avLst/>
+            <a:gdLst/>
+            <a:ahLst/>
+            <a:cxnLst/>
+            <a:rect l="l" t="t" r="r" b="b"/>
+            <a:pathLst>
+              <a:path w="120000" h="120000" extrusionOk="0">
+                <a:moveTo>
+                  <a:pt x="0" y="0"/>
+                </a:moveTo>
+                <a:lnTo>
+                  <a:pt x="120000" y="0"/>
+                </a:lnTo>
+                <a:lnTo>
+                  <a:pt x="120000" y="120000"/>
+                </a:lnTo>
+                <a:lnTo>
+                  <a:pt x="0" y="120000"/>
+                </a:lnTo>
+                <a:close/>
+              </a:path>
+            </a:pathLst>
+          </a:custGeom>
+        </p:spPr>
+      </p:sp>
+    </p:spTree>
+    <p:extLst>
+      <p:ext uri="{BB962C8B-B14F-4D97-AF65-F5344CB8AC3E}">
+        <p14:creationId xmlns:p14="http://schemas.microsoft.com/office/powerpoint/2010/main" val="3252588920"/>
+      </p:ext>
+    </p:extLst>
+  </p:cSld>
+  <p:clrMapOvr>
+    <a:masterClrMapping/>
+  </p:clrMapOvr>
+</p:notes>
+</file>
+
+<file path=ppt/notesSlides/notesSlide6.xml><?xml version="1.0" encoding="utf-8"?>
+<p:notes xmlns:a="http://schemas.openxmlformats.org/drawingml/2006/main" xmlns:r="http://schemas.openxmlformats.org/officeDocument/2006/relationships" xmlns:p="http://schemas.openxmlformats.org/presentationml/2006/main" showMasterSp="0" showMasterPhAnim="0">
+  <p:cSld>
+    <p:spTree>
+      <p:nvGrpSpPr>
+        <p:cNvPr id="1" name="Shape 105"/>
+        <p:cNvGrpSpPr/>
+        <p:nvPr/>
+      </p:nvGrpSpPr>
+      <p:grpSpPr>
+        <a:xfrm>
+          <a:off x="0" y="0"/>
+          <a:ext cx="0" cy="0"/>
+          <a:chOff x="0" y="0"/>
+          <a:chExt cx="0" cy="0"/>
+        </a:xfrm>
+      </p:grpSpPr>
+      <p:sp>
+        <p:nvSpPr>
+          <p:cNvPr id="106" name="Google Shape;106;p3:notes"/>
+          <p:cNvSpPr txBox="1">
+            <a:spLocks noGrp="1"/>
+          </p:cNvSpPr>
+          <p:nvPr>
+            <p:ph type="body" idx="1"/>
+          </p:nvPr>
+        </p:nvSpPr>
+        <p:spPr>
+          <a:xfrm>
+            <a:off x="685800" y="4343400"/>
+            <a:ext cx="5486400" cy="4114800"/>
+          </a:xfrm>
+          <a:prstGeom prst="rect">
+            <a:avLst/>
+          </a:prstGeom>
+        </p:spPr>
+        <p:txBody>
+          <a:bodyPr spcFirstLastPara="1" wrap="square" lIns="91425" tIns="45700" rIns="91425" bIns="45700" anchor="t" anchorCtr="0">
+            <a:noAutofit/>
+          </a:bodyPr>
+          <a:lstStyle/>
+          <a:p>
+            <a:pPr marL="0" lvl="0" indent="0" algn="l" rtl="0">
+              <a:spcBef>
+                <a:spcPts val="0"/>
+              </a:spcBef>
+              <a:spcAft>
+                <a:spcPts val="0"/>
+              </a:spcAft>
+              <a:buNone/>
+            </a:pPr>
+            <a:endParaRPr/>
+          </a:p>
+        </p:txBody>
+      </p:sp>
+      <p:sp>
+        <p:nvSpPr>
+          <p:cNvPr id="107" name="Google Shape;107;p3:notes"/>
+          <p:cNvSpPr>
+            <a:spLocks noGrp="1" noRot="1" noChangeAspect="1"/>
+          </p:cNvSpPr>
+          <p:nvPr>
+            <p:ph type="sldImg" idx="2"/>
+          </p:nvPr>
+        </p:nvSpPr>
+        <p:spPr>
+          <a:xfrm>
+            <a:off x="381000" y="685800"/>
+            <a:ext cx="6096000" cy="3429000"/>
+          </a:xfrm>
+          <a:custGeom>
+            <a:avLst/>
+            <a:gdLst/>
+            <a:ahLst/>
+            <a:cxnLst/>
+            <a:rect l="l" t="t" r="r" b="b"/>
+            <a:pathLst>
+              <a:path w="120000" h="120000" extrusionOk="0">
+                <a:moveTo>
+                  <a:pt x="0" y="0"/>
+                </a:moveTo>
+                <a:lnTo>
+                  <a:pt x="120000" y="0"/>
+                </a:lnTo>
+                <a:lnTo>
+                  <a:pt x="120000" y="120000"/>
+                </a:lnTo>
+                <a:lnTo>
+                  <a:pt x="0" y="120000"/>
+                </a:lnTo>
+                <a:close/>
+              </a:path>
+            </a:pathLst>
+          </a:custGeom>
+        </p:spPr>
+      </p:sp>
+    </p:spTree>
+    <p:extLst>
+      <p:ext uri="{BB962C8B-B14F-4D97-AF65-F5344CB8AC3E}">
+        <p14:creationId xmlns:p14="http://schemas.microsoft.com/office/powerpoint/2010/main" val="1615936708"/>
+      </p:ext>
+    </p:extLst>
+  </p:cSld>
+  <p:clrMapOvr>
+    <a:masterClrMapping/>
+  </p:clrMapOvr>
+</p:notes>
+</file>
+
+<file path=ppt/notesSlides/notesSlide7.xml><?xml version="1.0" encoding="utf-8"?>
+<p:notes xmlns:a="http://schemas.openxmlformats.org/drawingml/2006/main" xmlns:r="http://schemas.openxmlformats.org/officeDocument/2006/relationships" xmlns:p="http://schemas.openxmlformats.org/presentationml/2006/main" showMasterSp="0" showMasterPhAnim="0">
+  <p:cSld>
+    <p:spTree>
+      <p:nvGrpSpPr>
+        <p:cNvPr id="1" name="Shape 105"/>
+        <p:cNvGrpSpPr/>
+        <p:nvPr/>
+      </p:nvGrpSpPr>
+      <p:grpSpPr>
+        <a:xfrm>
+          <a:off x="0" y="0"/>
+          <a:ext cx="0" cy="0"/>
+          <a:chOff x="0" y="0"/>
+          <a:chExt cx="0" cy="0"/>
+        </a:xfrm>
+      </p:grpSpPr>
+      <p:sp>
+        <p:nvSpPr>
+          <p:cNvPr id="106" name="Google Shape;106;p3:notes"/>
+          <p:cNvSpPr txBox="1">
+            <a:spLocks noGrp="1"/>
+          </p:cNvSpPr>
+          <p:nvPr>
+            <p:ph type="body" idx="1"/>
+          </p:nvPr>
+        </p:nvSpPr>
+        <p:spPr>
+          <a:xfrm>
+            <a:off x="685800" y="4343400"/>
+            <a:ext cx="5486400" cy="4114800"/>
+          </a:xfrm>
+          <a:prstGeom prst="rect">
+            <a:avLst/>
+          </a:prstGeom>
+        </p:spPr>
+        <p:txBody>
+          <a:bodyPr spcFirstLastPara="1" wrap="square" lIns="91425" tIns="45700" rIns="91425" bIns="45700" anchor="t" anchorCtr="0">
+            <a:noAutofit/>
+          </a:bodyPr>
+          <a:lstStyle/>
+          <a:p>
+            <a:pPr marL="0" lvl="0" indent="0" algn="l" rtl="0">
+              <a:spcBef>
+                <a:spcPts val="0"/>
+              </a:spcBef>
+              <a:spcAft>
+                <a:spcPts val="0"/>
+              </a:spcAft>
+              <a:buNone/>
+            </a:pPr>
+            <a:endParaRPr/>
+          </a:p>
+        </p:txBody>
+      </p:sp>
+      <p:sp>
+        <p:nvSpPr>
+          <p:cNvPr id="107" name="Google Shape;107;p3:notes"/>
+          <p:cNvSpPr>
+            <a:spLocks noGrp="1" noRot="1" noChangeAspect="1"/>
+          </p:cNvSpPr>
+          <p:nvPr>
+            <p:ph type="sldImg" idx="2"/>
+          </p:nvPr>
+        </p:nvSpPr>
+        <p:spPr>
+          <a:xfrm>
+            <a:off x="381000" y="685800"/>
+            <a:ext cx="6096000" cy="3429000"/>
+          </a:xfrm>
+          <a:custGeom>
+            <a:avLst/>
+            <a:gdLst/>
+            <a:ahLst/>
+            <a:cxnLst/>
+            <a:rect l="l" t="t" r="r" b="b"/>
+            <a:pathLst>
+              <a:path w="120000" h="120000" extrusionOk="0">
+                <a:moveTo>
+                  <a:pt x="0" y="0"/>
+                </a:moveTo>
+                <a:lnTo>
+                  <a:pt x="120000" y="0"/>
+                </a:lnTo>
+                <a:lnTo>
+                  <a:pt x="120000" y="120000"/>
+                </a:lnTo>
+                <a:lnTo>
+                  <a:pt x="0" y="120000"/>
+                </a:lnTo>
+                <a:close/>
+              </a:path>
+            </a:pathLst>
+          </a:custGeom>
+        </p:spPr>
+      </p:sp>
+    </p:spTree>
+    <p:extLst>
+      <p:ext uri="{BB962C8B-B14F-4D97-AF65-F5344CB8AC3E}">
+        <p14:creationId xmlns:p14="http://schemas.microsoft.com/office/powerpoint/2010/main" val="512410789"/>
+      </p:ext>
+    </p:extLst>
+  </p:cSld>
+  <p:clrMapOvr>
+    <a:masterClrMapping/>
+  </p:clrMapOvr>
+</p:notes>
+</file>
+
+<file path=ppt/notesSlides/notesSlide8.xml><?xml version="1.0" encoding="utf-8"?>
+<p:notes xmlns:a="http://schemas.openxmlformats.org/drawingml/2006/main" xmlns:r="http://schemas.openxmlformats.org/officeDocument/2006/relationships" xmlns:p="http://schemas.openxmlformats.org/presentationml/2006/main" showMasterSp="0" showMasterPhAnim="0">
+  <p:cSld>
+    <p:spTree>
+      <p:nvGrpSpPr>
+        <p:cNvPr id="1" name="Shape 166"/>
+        <p:cNvGrpSpPr/>
+        <p:nvPr/>
+      </p:nvGrpSpPr>
+      <p:grpSpPr>
+        <a:xfrm>
+          <a:off x="0" y="0"/>
+          <a:ext cx="0" cy="0"/>
+          <a:chOff x="0" y="0"/>
+          <a:chExt cx="0" cy="0"/>
+        </a:xfrm>
+      </p:grpSpPr>
+      <p:sp>
+        <p:nvSpPr>
+          <p:cNvPr id="167" name="Google Shape;167;p9:notes"/>
+          <p:cNvSpPr txBox="1">
+            <a:spLocks noGrp="1"/>
+          </p:cNvSpPr>
+          <p:nvPr>
+            <p:ph type="body" idx="1"/>
+          </p:nvPr>
+        </p:nvSpPr>
+        <p:spPr>
+          <a:xfrm>
+            <a:off x="685800" y="4343400"/>
+            <a:ext cx="5486400" cy="4114800"/>
+          </a:xfrm>
+          <a:prstGeom prst="rect">
+            <a:avLst/>
+          </a:prstGeom>
+        </p:spPr>
+        <p:txBody>
+          <a:bodyPr spcFirstLastPara="1" wrap="square" lIns="91425" tIns="45700" rIns="91425" bIns="45700" anchor="t" anchorCtr="0">
+            <a:noAutofit/>
+          </a:bodyPr>
+          <a:lstStyle/>
+          <a:p>
+            <a:pPr marL="0" lvl="0" indent="0" algn="l" rtl="0">
+              <a:spcBef>
+                <a:spcPts val="0"/>
+              </a:spcBef>
+              <a:spcAft>
+                <a:spcPts val="0"/>
+              </a:spcAft>
+              <a:buNone/>
+            </a:pPr>
+            <a:endParaRPr/>
+          </a:p>
+        </p:txBody>
+      </p:sp>
+      <p:sp>
+        <p:nvSpPr>
+          <p:cNvPr id="168" name="Google Shape;168;p9:notes"/>
+          <p:cNvSpPr>
+            <a:spLocks noGrp="1" noRot="1" noChangeAspect="1"/>
+          </p:cNvSpPr>
+          <p:nvPr>
+            <p:ph type="sldImg" idx="2"/>
+          </p:nvPr>
+        </p:nvSpPr>
+        <p:spPr>
+          <a:xfrm>
+            <a:off x="381000" y="685800"/>
+            <a:ext cx="6096000" cy="3429000"/>
+          </a:xfrm>
+          <a:custGeom>
+            <a:avLst/>
+            <a:gdLst/>
+            <a:ahLst/>
+            <a:cxnLst/>
+            <a:rect l="l" t="t" r="r" b="b"/>
+            <a:pathLst>
+              <a:path w="120000" h="120000" extrusionOk="0">
+                <a:moveTo>
+                  <a:pt x="0" y="0"/>
+                </a:moveTo>
+                <a:lnTo>
+                  <a:pt x="120000" y="0"/>
+                </a:lnTo>
+                <a:lnTo>
+                  <a:pt x="120000" y="120000"/>
+                </a:lnTo>
+                <a:lnTo>
+                  <a:pt x="0" y="120000"/>
+                </a:lnTo>
+                <a:close/>
+              </a:path>
+            </a:pathLst>
+          </a:custGeom>
+        </p:spPr>
+      </p:sp>
+    </p:spTree>
+    <p:extLst>
+      <p:ext uri="{BB962C8B-B14F-4D97-AF65-F5344CB8AC3E}">
+        <p14:creationId xmlns:p14="http://schemas.microsoft.com/office/powerpoint/2010/main" val="3443963375"/>
+      </p:ext>
+    </p:extLst>
+  </p:cSld>
+  <p:clrMapOvr>
+    <a:masterClrMapping/>
+  </p:clrMapOvr>
+</p:notes>
+</file>
+
+<file path=ppt/notesSlides/notesSlide9.xml><?xml version="1.0" encoding="utf-8"?>
+<p:notes xmlns:a="http://schemas.openxmlformats.org/drawingml/2006/main" xmlns:r="http://schemas.openxmlformats.org/officeDocument/2006/relationships" xmlns:p="http://schemas.openxmlformats.org/presentationml/2006/main" showMasterSp="0" showMasterPhAnim="0">
+  <p:cSld>
+    <p:spTree>
+      <p:nvGrpSpPr>
+        <p:cNvPr id="1" name="Shape 156"/>
+        <p:cNvGrpSpPr/>
+        <p:nvPr/>
+      </p:nvGrpSpPr>
+      <p:grpSpPr>
+        <a:xfrm>
+          <a:off x="0" y="0"/>
+          <a:ext cx="0" cy="0"/>
+          <a:chOff x="0" y="0"/>
+          <a:chExt cx="0" cy="0"/>
+        </a:xfrm>
+      </p:grpSpPr>
+      <p:sp>
+        <p:nvSpPr>
+          <p:cNvPr id="157" name="Google Shape;157;p8:notes"/>
+          <p:cNvSpPr txBox="1">
+            <a:spLocks noGrp="1"/>
+          </p:cNvSpPr>
+          <p:nvPr>
+            <p:ph type="body" idx="1"/>
+          </p:nvPr>
+        </p:nvSpPr>
+        <p:spPr>
+          <a:xfrm>
+            <a:off x="685800" y="4343400"/>
+            <a:ext cx="5486400" cy="4114800"/>
+          </a:xfrm>
+          <a:prstGeom prst="rect">
+            <a:avLst/>
+          </a:prstGeom>
+        </p:spPr>
+        <p:txBody>
+          <a:bodyPr spcFirstLastPara="1" wrap="square" lIns="91425" tIns="45700" rIns="91425" bIns="45700" anchor="t" anchorCtr="0">
+            <a:noAutofit/>
+          </a:bodyPr>
+          <a:lstStyle/>
+          <a:p>
+            <a:pPr marL="0" lvl="0" indent="0" algn="l" rtl="0">
+              <a:spcBef>
+                <a:spcPts val="0"/>
+              </a:spcBef>
+              <a:spcAft>
+                <a:spcPts val="0"/>
+              </a:spcAft>
+              <a:buNone/>
+            </a:pPr>
+            <a:endParaRPr/>
+          </a:p>
+        </p:txBody>
+      </p:sp>
+      <p:sp>
+        <p:nvSpPr>
+          <p:cNvPr id="158" name="Google Shape;158;p8:notes"/>
+          <p:cNvSpPr>
+            <a:spLocks noGrp="1" noRot="1" noChangeAspect="1"/>
+          </p:cNvSpPr>
+          <p:nvPr>
+            <p:ph type="sldImg" idx="2"/>
+          </p:nvPr>
+        </p:nvSpPr>
+        <p:spPr>
+          <a:xfrm>
+            <a:off x="381000" y="685800"/>
+            <a:ext cx="6096000" cy="3429000"/>
+          </a:xfrm>
+          <a:custGeom>
+            <a:avLst/>
+            <a:gdLst/>
+            <a:ahLst/>
+            <a:cxnLst/>
+            <a:rect l="l" t="t" r="r" b="b"/>
+            <a:pathLst>
+              <a:path w="120000" h="120000" extrusionOk="0">
+                <a:moveTo>
+                  <a:pt x="0" y="0"/>
+                </a:moveTo>
+                <a:lnTo>
+                  <a:pt x="120000" y="0"/>
+                </a:lnTo>
+                <a:lnTo>
+                  <a:pt x="120000" y="120000"/>
+                </a:lnTo>
+                <a:lnTo>
+                  <a:pt x="0" y="120000"/>
+                </a:lnTo>
+                <a:close/>
+              </a:path>
+            </a:pathLst>
+          </a:custGeom>
+        </p:spPr>
+      </p:sp>
+    </p:spTree>
+    <p:extLst>
+      <p:ext uri="{BB962C8B-B14F-4D97-AF65-F5344CB8AC3E}">
+        <p14:creationId xmlns:p14="http://schemas.microsoft.com/office/powerpoint/2010/main" val="3678687114"/>
       </p:ext>
     </p:extLst>
   </p:cSld>
@@ -5025,19 +6245,7 @@
                 <a:cs typeface="Montserrat Medium"/>
                 <a:sym typeface="Montserrat Medium"/>
               </a:rPr>
-              <a:t>017</a:t>
-            </a:r>
-            <a:r>
-              <a:rPr lang="en-US" dirty="0" smtClean="0">
-                <a:solidFill>
-                  <a:schemeClr val="dk1"/>
-                </a:solidFill>
-                <a:latin typeface="Montserrat Medium"/>
-                <a:ea typeface="Montserrat Medium"/>
-                <a:cs typeface="Montserrat Medium"/>
-                <a:sym typeface="Montserrat Medium"/>
-              </a:rPr>
-              <a:t>)</a:t>
+              <a:t>017)</a:t>
             </a:r>
           </a:p>
           <a:p>
@@ -5638,8 +6846,8 @@
         </p:nvSpPr>
         <p:spPr>
           <a:xfrm>
-            <a:off x="2083850" y="378475"/>
-            <a:ext cx="6579900" cy="354000"/>
+            <a:off x="2083850" y="378474"/>
+            <a:ext cx="6579900" cy="1084565"/>
           </a:xfrm>
           <a:prstGeom prst="rect">
             <a:avLst/>
@@ -5665,7 +6873,7 @@
               <a:buNone/>
             </a:pPr>
             <a:r>
-              <a:rPr lang="en-US" sz="1900" b="1">
+              <a:rPr lang="en-US" sz="1900" b="1" dirty="0">
                 <a:latin typeface="Montserrat"/>
                 <a:ea typeface="Montserrat"/>
                 <a:cs typeface="Montserrat"/>
@@ -5673,7 +6881,7 @@
               </a:rPr>
               <a:t>DAYANANDA SAGAR COLLEGE OF ENGINEERING</a:t>
             </a:r>
-            <a:endParaRPr sz="1900" b="1">
+            <a:endParaRPr sz="1900" b="1" dirty="0">
               <a:latin typeface="Montserrat"/>
               <a:ea typeface="Montserrat"/>
               <a:cs typeface="Montserrat"/>
@@ -5691,15 +6899,42 @@
               <a:buNone/>
             </a:pPr>
             <a:r>
-              <a:rPr lang="en-US">
+              <a:rPr lang="en-US" dirty="0" err="1">
                 <a:latin typeface="Montserrat Medium"/>
                 <a:ea typeface="Montserrat Medium"/>
                 <a:cs typeface="Montserrat Medium"/>
                 <a:sym typeface="Montserrat Medium"/>
               </a:rPr>
-              <a:t>Malleshwara Hills, Kumarswamy Layout, Bangalore - 560111</a:t>
-            </a:r>
-            <a:endParaRPr>
+              <a:t>Malleshwara</a:t>
+            </a:r>
+            <a:r>
+              <a:rPr lang="en-US" dirty="0">
+                <a:latin typeface="Montserrat Medium"/>
+                <a:ea typeface="Montserrat Medium"/>
+                <a:cs typeface="Montserrat Medium"/>
+                <a:sym typeface="Montserrat Medium"/>
+              </a:rPr>
+              <a:t> Hills, </a:t>
+            </a:r>
+            <a:r>
+              <a:rPr lang="en-US" dirty="0" err="1">
+                <a:latin typeface="Montserrat Medium"/>
+                <a:ea typeface="Montserrat Medium"/>
+                <a:cs typeface="Montserrat Medium"/>
+                <a:sym typeface="Montserrat Medium"/>
+              </a:rPr>
+              <a:t>Kumarswamy</a:t>
+            </a:r>
+            <a:r>
+              <a:rPr lang="en-US" dirty="0">
+                <a:latin typeface="Montserrat Medium"/>
+                <a:ea typeface="Montserrat Medium"/>
+                <a:cs typeface="Montserrat Medium"/>
+                <a:sym typeface="Montserrat Medium"/>
+              </a:rPr>
+              <a:t> Layout, Bangalore - 560111</a:t>
+            </a:r>
+            <a:endParaRPr dirty="0">
               <a:latin typeface="Montserrat Medium"/>
               <a:ea typeface="Montserrat Medium"/>
               <a:cs typeface="Montserrat Medium"/>
@@ -5717,7 +6952,7 @@
               <a:buNone/>
             </a:pPr>
             <a:r>
-              <a:rPr lang="en-US" sz="1700" b="1">
+              <a:rPr lang="en-US" sz="1700" b="1" dirty="0">
                 <a:latin typeface="Montserrat"/>
                 <a:ea typeface="Montserrat"/>
                 <a:cs typeface="Montserrat"/>
@@ -5725,7 +6960,7 @@
               </a:rPr>
               <a:t>Department of Information Science and Engineering</a:t>
             </a:r>
-            <a:endParaRPr sz="1700" b="1">
+            <a:endParaRPr sz="1700" b="1" dirty="0">
               <a:latin typeface="Montserrat"/>
               <a:ea typeface="Montserrat"/>
               <a:cs typeface="Montserrat"/>
@@ -5742,7 +6977,710 @@
 </p:sld>
 </file>
 
-<file path=ppt/slides/slide2.xml><?xml version="1.0" encoding="utf-8"?>
+<file path=ppt/slides/slide10.xml><?xml version="1.0" encoding="utf-8"?>
+<p:sld xmlns:a="http://schemas.openxmlformats.org/drawingml/2006/main" xmlns:r="http://schemas.openxmlformats.org/officeDocument/2006/relationships" xmlns:p="http://schemas.openxmlformats.org/presentationml/2006/main">
+  <p:cSld>
+    <p:spTree>
+      <p:nvGrpSpPr>
+        <p:cNvPr id="1" name="Shape 189"/>
+        <p:cNvGrpSpPr/>
+        <p:nvPr/>
+      </p:nvGrpSpPr>
+      <p:grpSpPr>
+        <a:xfrm>
+          <a:off x="0" y="0"/>
+          <a:ext cx="0" cy="0"/>
+          <a:chOff x="0" y="0"/>
+          <a:chExt cx="0" cy="0"/>
+        </a:xfrm>
+      </p:grpSpPr>
+      <p:sp>
+        <p:nvSpPr>
+          <p:cNvPr id="190" name="Google Shape;190;p23"/>
+          <p:cNvSpPr txBox="1">
+            <a:spLocks noGrp="1"/>
+          </p:cNvSpPr>
+          <p:nvPr>
+            <p:ph type="title"/>
+          </p:nvPr>
+        </p:nvSpPr>
+        <p:spPr>
+          <a:xfrm>
+            <a:off x="1428750" y="1543050"/>
+            <a:ext cx="6172200" cy="514350"/>
+          </a:xfrm>
+          <a:prstGeom prst="rect">
+            <a:avLst/>
+          </a:prstGeom>
+          <a:noFill/>
+          <a:ln>
+            <a:noFill/>
+          </a:ln>
+        </p:spPr>
+        <p:txBody>
+          <a:bodyPr spcFirstLastPara="1" vert="horz" wrap="square" lIns="68569" tIns="34275" rIns="68569" bIns="34275" rtlCol="0" anchor="ctr" anchorCtr="0">
+            <a:normAutofit/>
+          </a:bodyPr>
+          <a:lstStyle/>
+          <a:p>
+            <a:pPr algn="ctr">
+              <a:spcBef>
+                <a:spcPts val="0"/>
+              </a:spcBef>
+              <a:buClr>
+                <a:schemeClr val="dk1"/>
+              </a:buClr>
+              <a:buSzPts val="3200"/>
+            </a:pPr>
+            <a:r>
+              <a:rPr lang="en-US" sz="2400"/>
+              <a:t>           CONCLUSION</a:t>
+            </a:r>
+            <a:endParaRPr sz="2400"/>
+          </a:p>
+        </p:txBody>
+      </p:sp>
+      <p:sp>
+        <p:nvSpPr>
+          <p:cNvPr id="193" name="Google Shape;193;p23"/>
+          <p:cNvSpPr txBox="1">
+            <a:spLocks noGrp="1"/>
+          </p:cNvSpPr>
+          <p:nvPr>
+            <p:ph type="sldNum" idx="12"/>
+          </p:nvPr>
+        </p:nvSpPr>
+        <p:spPr>
+          <a:xfrm>
+            <a:off x="6057900" y="4767263"/>
+            <a:ext cx="1600200" cy="273844"/>
+          </a:xfrm>
+          <a:prstGeom prst="rect">
+            <a:avLst/>
+          </a:prstGeom>
+          <a:noFill/>
+          <a:ln>
+            <a:noFill/>
+          </a:ln>
+        </p:spPr>
+        <p:txBody>
+          <a:bodyPr spcFirstLastPara="1" vert="horz" wrap="square" lIns="68569" tIns="34275" rIns="68569" bIns="34275" rtlCol="0" anchor="ctr" anchorCtr="0">
+            <a:noAutofit/>
+          </a:bodyPr>
+          <a:lstStyle/>
+          <a:p>
+            <a:fld id="{00000000-1234-1234-1234-123412341234}" type="slidenum">
+              <a:rPr lang="en-US"/>
+              <a:pPr/>
+              <a:t>10</a:t>
+            </a:fld>
+            <a:endParaRPr/>
+          </a:p>
+        </p:txBody>
+      </p:sp>
+      <p:sp>
+        <p:nvSpPr>
+          <p:cNvPr id="194" name="Google Shape;194;p23"/>
+          <p:cNvSpPr txBox="1"/>
+          <p:nvPr/>
+        </p:nvSpPr>
+        <p:spPr>
+          <a:xfrm>
+            <a:off x="1485900" y="2286000"/>
+            <a:ext cx="6172200" cy="2343150"/>
+          </a:xfrm>
+          <a:prstGeom prst="rect">
+            <a:avLst/>
+          </a:prstGeom>
+          <a:noFill/>
+          <a:ln>
+            <a:noFill/>
+          </a:ln>
+        </p:spPr>
+        <p:txBody>
+          <a:bodyPr spcFirstLastPara="1" wrap="square" lIns="68569" tIns="34275" rIns="68569" bIns="34275" anchor="t" anchorCtr="0">
+            <a:normAutofit/>
+          </a:bodyPr>
+          <a:lstStyle/>
+          <a:p>
+            <a:pPr marL="257175" indent="-257175">
+              <a:buClr>
+                <a:schemeClr val="dk1"/>
+              </a:buClr>
+              <a:buSzPts val="3200"/>
+            </a:pPr>
+            <a:endParaRPr sz="2400">
+              <a:solidFill>
+                <a:schemeClr val="dk1"/>
+              </a:solidFill>
+              <a:latin typeface="Calibri"/>
+              <a:ea typeface="Calibri"/>
+              <a:cs typeface="Calibri"/>
+              <a:sym typeface="Calibri"/>
+            </a:endParaRPr>
+          </a:p>
+        </p:txBody>
+      </p:sp>
+      <p:sp>
+        <p:nvSpPr>
+          <p:cNvPr id="195" name="Google Shape;195;p23"/>
+          <p:cNvSpPr txBox="1"/>
+          <p:nvPr/>
+        </p:nvSpPr>
+        <p:spPr>
+          <a:xfrm>
+            <a:off x="1543050" y="3486150"/>
+            <a:ext cx="6172200" cy="571500"/>
+          </a:xfrm>
+          <a:prstGeom prst="rect">
+            <a:avLst/>
+          </a:prstGeom>
+          <a:noFill/>
+          <a:ln>
+            <a:noFill/>
+          </a:ln>
+        </p:spPr>
+        <p:txBody>
+          <a:bodyPr spcFirstLastPara="1" wrap="square" lIns="68569" tIns="34275" rIns="68569" bIns="34275" anchor="ctr" anchorCtr="0">
+            <a:normAutofit/>
+          </a:bodyPr>
+          <a:lstStyle/>
+          <a:p>
+            <a:pPr>
+              <a:buClr>
+                <a:schemeClr val="dk1"/>
+              </a:buClr>
+              <a:buSzPts val="3200"/>
+            </a:pPr>
+            <a:endParaRPr sz="2400">
+              <a:solidFill>
+                <a:schemeClr val="dk1"/>
+              </a:solidFill>
+              <a:latin typeface="Calibri"/>
+              <a:ea typeface="Calibri"/>
+              <a:cs typeface="Calibri"/>
+              <a:sym typeface="Calibri"/>
+            </a:endParaRPr>
+          </a:p>
+        </p:txBody>
+      </p:sp>
+      <p:pic>
+        <p:nvPicPr>
+          <p:cNvPr id="8" name="Picture 7" descr="C:\Users\KrupaShankari\Downloads\Revised_ISE_Logo.png"/>
+          <p:cNvPicPr/>
+          <p:nvPr/>
+        </p:nvPicPr>
+        <p:blipFill>
+          <a:blip r:embed="rId3" cstate="print">
+            <a:extLst>
+              <a:ext uri="{28A0092B-C50C-407E-A947-70E740481C1C}">
+                <a14:useLocalDpi xmlns:a14="http://schemas.microsoft.com/office/drawing/2010/main" val="0"/>
+              </a:ext>
+            </a:extLst>
+          </a:blip>
+          <a:srcRect/>
+          <a:stretch>
+            <a:fillRect/>
+          </a:stretch>
+        </p:blipFill>
+        <p:spPr bwMode="auto">
+          <a:xfrm>
+            <a:off x="1543929" y="321249"/>
+            <a:ext cx="6045591" cy="1113656"/>
+          </a:xfrm>
+          <a:prstGeom prst="rect">
+            <a:avLst/>
+          </a:prstGeom>
+          <a:noFill/>
+          <a:ln>
+            <a:noFill/>
+          </a:ln>
+        </p:spPr>
+      </p:pic>
+    </p:spTree>
+    <p:extLst>
+      <p:ext uri="{BB962C8B-B14F-4D97-AF65-F5344CB8AC3E}">
+        <p14:creationId xmlns:p14="http://schemas.microsoft.com/office/powerpoint/2010/main" val="3537971770"/>
+      </p:ext>
+    </p:extLst>
+  </p:cSld>
+  <p:clrMapOvr>
+    <a:masterClrMapping/>
+  </p:clrMapOvr>
+</p:sld>
+</file>
+
+<file path=ppt/slides/slide11.xml><?xml version="1.0" encoding="utf-8"?>
+<p:sld xmlns:a="http://schemas.openxmlformats.org/drawingml/2006/main" xmlns:r="http://schemas.openxmlformats.org/officeDocument/2006/relationships" xmlns:p="http://schemas.openxmlformats.org/presentationml/2006/main">
+  <p:cSld>
+    <p:spTree>
+      <p:nvGrpSpPr>
+        <p:cNvPr id="1" name="Shape 189"/>
+        <p:cNvGrpSpPr/>
+        <p:nvPr/>
+      </p:nvGrpSpPr>
+      <p:grpSpPr>
+        <a:xfrm>
+          <a:off x="0" y="0"/>
+          <a:ext cx="0" cy="0"/>
+          <a:chOff x="0" y="0"/>
+          <a:chExt cx="0" cy="0"/>
+        </a:xfrm>
+      </p:grpSpPr>
+      <p:sp>
+        <p:nvSpPr>
+          <p:cNvPr id="190" name="Google Shape;190;p23"/>
+          <p:cNvSpPr txBox="1">
+            <a:spLocks noGrp="1"/>
+          </p:cNvSpPr>
+          <p:nvPr>
+            <p:ph type="title"/>
+          </p:nvPr>
+        </p:nvSpPr>
+        <p:spPr>
+          <a:xfrm>
+            <a:off x="1428750" y="1543050"/>
+            <a:ext cx="6172200" cy="514350"/>
+          </a:xfrm>
+          <a:prstGeom prst="rect">
+            <a:avLst/>
+          </a:prstGeom>
+          <a:noFill/>
+          <a:ln>
+            <a:noFill/>
+          </a:ln>
+        </p:spPr>
+        <p:txBody>
+          <a:bodyPr spcFirstLastPara="1" vert="horz" wrap="square" lIns="68569" tIns="34275" rIns="68569" bIns="34275" rtlCol="0" anchor="ctr" anchorCtr="0">
+            <a:normAutofit/>
+          </a:bodyPr>
+          <a:lstStyle/>
+          <a:p>
+            <a:pPr algn="ctr">
+              <a:spcBef>
+                <a:spcPts val="0"/>
+              </a:spcBef>
+              <a:buClr>
+                <a:schemeClr val="dk1"/>
+              </a:buClr>
+              <a:buSzPts val="3200"/>
+            </a:pPr>
+            <a:r>
+              <a:rPr lang="en-US" sz="2400" dirty="0"/>
+              <a:t>          </a:t>
+            </a:r>
+            <a:r>
+              <a:rPr lang="en-US" sz="2400" dirty="0"/>
+              <a:t>FUTURE ENHANCEMENTS</a:t>
+            </a:r>
+            <a:endParaRPr sz="2400"/>
+          </a:p>
+        </p:txBody>
+      </p:sp>
+      <p:sp>
+        <p:nvSpPr>
+          <p:cNvPr id="193" name="Google Shape;193;p23"/>
+          <p:cNvSpPr txBox="1">
+            <a:spLocks noGrp="1"/>
+          </p:cNvSpPr>
+          <p:nvPr>
+            <p:ph type="sldNum" idx="12"/>
+          </p:nvPr>
+        </p:nvSpPr>
+        <p:spPr>
+          <a:xfrm>
+            <a:off x="6057900" y="4767263"/>
+            <a:ext cx="1600200" cy="273844"/>
+          </a:xfrm>
+          <a:prstGeom prst="rect">
+            <a:avLst/>
+          </a:prstGeom>
+          <a:noFill/>
+          <a:ln>
+            <a:noFill/>
+          </a:ln>
+        </p:spPr>
+        <p:txBody>
+          <a:bodyPr spcFirstLastPara="1" vert="horz" wrap="square" lIns="68569" tIns="34275" rIns="68569" bIns="34275" rtlCol="0" anchor="ctr" anchorCtr="0">
+            <a:noAutofit/>
+          </a:bodyPr>
+          <a:lstStyle/>
+          <a:p>
+            <a:fld id="{00000000-1234-1234-1234-123412341234}" type="slidenum">
+              <a:rPr lang="en-US"/>
+              <a:pPr/>
+              <a:t>11</a:t>
+            </a:fld>
+            <a:endParaRPr/>
+          </a:p>
+        </p:txBody>
+      </p:sp>
+      <p:sp>
+        <p:nvSpPr>
+          <p:cNvPr id="194" name="Google Shape;194;p23"/>
+          <p:cNvSpPr txBox="1"/>
+          <p:nvPr/>
+        </p:nvSpPr>
+        <p:spPr>
+          <a:xfrm>
+            <a:off x="1485900" y="2286000"/>
+            <a:ext cx="6172200" cy="2343150"/>
+          </a:xfrm>
+          <a:prstGeom prst="rect">
+            <a:avLst/>
+          </a:prstGeom>
+          <a:noFill/>
+          <a:ln>
+            <a:noFill/>
+          </a:ln>
+        </p:spPr>
+        <p:txBody>
+          <a:bodyPr spcFirstLastPara="1" wrap="square" lIns="68569" tIns="34275" rIns="68569" bIns="34275" anchor="t" anchorCtr="0">
+            <a:normAutofit/>
+          </a:bodyPr>
+          <a:lstStyle/>
+          <a:p>
+            <a:pPr marL="257175" indent="-257175">
+              <a:buClr>
+                <a:schemeClr val="dk1"/>
+              </a:buClr>
+              <a:buSzPts val="3200"/>
+            </a:pPr>
+            <a:endParaRPr sz="2400">
+              <a:solidFill>
+                <a:schemeClr val="dk1"/>
+              </a:solidFill>
+              <a:latin typeface="Calibri"/>
+              <a:ea typeface="Calibri"/>
+              <a:cs typeface="Calibri"/>
+              <a:sym typeface="Calibri"/>
+            </a:endParaRPr>
+          </a:p>
+        </p:txBody>
+      </p:sp>
+      <p:sp>
+        <p:nvSpPr>
+          <p:cNvPr id="195" name="Google Shape;195;p23"/>
+          <p:cNvSpPr txBox="1"/>
+          <p:nvPr/>
+        </p:nvSpPr>
+        <p:spPr>
+          <a:xfrm>
+            <a:off x="1543050" y="3486150"/>
+            <a:ext cx="6172200" cy="571500"/>
+          </a:xfrm>
+          <a:prstGeom prst="rect">
+            <a:avLst/>
+          </a:prstGeom>
+          <a:noFill/>
+          <a:ln>
+            <a:noFill/>
+          </a:ln>
+        </p:spPr>
+        <p:txBody>
+          <a:bodyPr spcFirstLastPara="1" wrap="square" lIns="68569" tIns="34275" rIns="68569" bIns="34275" anchor="ctr" anchorCtr="0">
+            <a:normAutofit/>
+          </a:bodyPr>
+          <a:lstStyle/>
+          <a:p>
+            <a:pPr>
+              <a:buClr>
+                <a:schemeClr val="dk1"/>
+              </a:buClr>
+              <a:buSzPts val="3200"/>
+            </a:pPr>
+            <a:endParaRPr sz="2400">
+              <a:solidFill>
+                <a:schemeClr val="dk1"/>
+              </a:solidFill>
+              <a:latin typeface="Calibri"/>
+              <a:ea typeface="Calibri"/>
+              <a:cs typeface="Calibri"/>
+              <a:sym typeface="Calibri"/>
+            </a:endParaRPr>
+          </a:p>
+        </p:txBody>
+      </p:sp>
+      <p:pic>
+        <p:nvPicPr>
+          <p:cNvPr id="8" name="Picture 7" descr="C:\Users\KrupaShankari\Downloads\Revised_ISE_Logo.png"/>
+          <p:cNvPicPr/>
+          <p:nvPr/>
+        </p:nvPicPr>
+        <p:blipFill>
+          <a:blip r:embed="rId3" cstate="print">
+            <a:extLst>
+              <a:ext uri="{28A0092B-C50C-407E-A947-70E740481C1C}">
+                <a14:useLocalDpi xmlns:a14="http://schemas.microsoft.com/office/drawing/2010/main" val="0"/>
+              </a:ext>
+            </a:extLst>
+          </a:blip>
+          <a:srcRect/>
+          <a:stretch>
+            <a:fillRect/>
+          </a:stretch>
+        </p:blipFill>
+        <p:spPr bwMode="auto">
+          <a:xfrm>
+            <a:off x="1543929" y="321249"/>
+            <a:ext cx="6045591" cy="1113656"/>
+          </a:xfrm>
+          <a:prstGeom prst="rect">
+            <a:avLst/>
+          </a:prstGeom>
+          <a:noFill/>
+          <a:ln>
+            <a:noFill/>
+          </a:ln>
+        </p:spPr>
+      </p:pic>
+    </p:spTree>
+    <p:extLst>
+      <p:ext uri="{BB962C8B-B14F-4D97-AF65-F5344CB8AC3E}">
+        <p14:creationId xmlns:p14="http://schemas.microsoft.com/office/powerpoint/2010/main" val="2765641510"/>
+      </p:ext>
+    </p:extLst>
+  </p:cSld>
+  <p:clrMapOvr>
+    <a:masterClrMapping/>
+  </p:clrMapOvr>
+</p:sld>
+</file>
+
+<file path=ppt/slides/slide12.xml><?xml version="1.0" encoding="utf-8"?>
+<p:sld xmlns:a="http://schemas.openxmlformats.org/drawingml/2006/main" xmlns:r="http://schemas.openxmlformats.org/officeDocument/2006/relationships" xmlns:p="http://schemas.openxmlformats.org/presentationml/2006/main">
+  <p:cSld>
+    <p:spTree>
+      <p:nvGrpSpPr>
+        <p:cNvPr id="1" name="Shape 199"/>
+        <p:cNvGrpSpPr/>
+        <p:nvPr/>
+      </p:nvGrpSpPr>
+      <p:grpSpPr>
+        <a:xfrm>
+          <a:off x="0" y="0"/>
+          <a:ext cx="0" cy="0"/>
+          <a:chOff x="0" y="0"/>
+          <a:chExt cx="0" cy="0"/>
+        </a:xfrm>
+      </p:grpSpPr>
+      <p:sp>
+        <p:nvSpPr>
+          <p:cNvPr id="200" name="Google Shape;200;p24"/>
+          <p:cNvSpPr txBox="1">
+            <a:spLocks noGrp="1"/>
+          </p:cNvSpPr>
+          <p:nvPr>
+            <p:ph type="title"/>
+          </p:nvPr>
+        </p:nvSpPr>
+        <p:spPr>
+          <a:xfrm>
+            <a:off x="1428750" y="1543050"/>
+            <a:ext cx="6172200" cy="514350"/>
+          </a:xfrm>
+          <a:prstGeom prst="rect">
+            <a:avLst/>
+          </a:prstGeom>
+          <a:noFill/>
+          <a:ln>
+            <a:noFill/>
+          </a:ln>
+        </p:spPr>
+        <p:txBody>
+          <a:bodyPr spcFirstLastPara="1" vert="horz" wrap="square" lIns="68569" tIns="34275" rIns="68569" bIns="34275" rtlCol="0" anchor="ctr" anchorCtr="0">
+            <a:normAutofit/>
+          </a:bodyPr>
+          <a:lstStyle/>
+          <a:p>
+            <a:pPr algn="ctr">
+              <a:spcBef>
+                <a:spcPts val="0"/>
+              </a:spcBef>
+              <a:buClr>
+                <a:schemeClr val="dk1"/>
+              </a:buClr>
+              <a:buSzPts val="3200"/>
+            </a:pPr>
+            <a:r>
+              <a:rPr lang="en-US" sz="2400"/>
+              <a:t>       LEARNING OUTCOMES	</a:t>
+            </a:r>
+            <a:endParaRPr sz="2400"/>
+          </a:p>
+        </p:txBody>
+      </p:sp>
+      <p:sp>
+        <p:nvSpPr>
+          <p:cNvPr id="203" name="Google Shape;203;p24"/>
+          <p:cNvSpPr txBox="1">
+            <a:spLocks noGrp="1"/>
+          </p:cNvSpPr>
+          <p:nvPr>
+            <p:ph type="sldNum" idx="12"/>
+          </p:nvPr>
+        </p:nvSpPr>
+        <p:spPr>
+          <a:xfrm>
+            <a:off x="6057900" y="4767263"/>
+            <a:ext cx="1600200" cy="273844"/>
+          </a:xfrm>
+          <a:prstGeom prst="rect">
+            <a:avLst/>
+          </a:prstGeom>
+          <a:noFill/>
+          <a:ln>
+            <a:noFill/>
+          </a:ln>
+        </p:spPr>
+        <p:txBody>
+          <a:bodyPr spcFirstLastPara="1" vert="horz" wrap="square" lIns="68569" tIns="34275" rIns="68569" bIns="34275" rtlCol="0" anchor="ctr" anchorCtr="0">
+            <a:noAutofit/>
+          </a:bodyPr>
+          <a:lstStyle/>
+          <a:p>
+            <a:fld id="{00000000-1234-1234-1234-123412341234}" type="slidenum">
+              <a:rPr lang="en-US"/>
+              <a:pPr/>
+              <a:t>12</a:t>
+            </a:fld>
+            <a:endParaRPr/>
+          </a:p>
+        </p:txBody>
+      </p:sp>
+      <p:sp>
+        <p:nvSpPr>
+          <p:cNvPr id="204" name="Google Shape;204;p24"/>
+          <p:cNvSpPr txBox="1"/>
+          <p:nvPr/>
+        </p:nvSpPr>
+        <p:spPr>
+          <a:xfrm>
+            <a:off x="1485900" y="2286000"/>
+            <a:ext cx="6172200" cy="2343150"/>
+          </a:xfrm>
+          <a:prstGeom prst="rect">
+            <a:avLst/>
+          </a:prstGeom>
+          <a:noFill/>
+          <a:ln>
+            <a:noFill/>
+          </a:ln>
+        </p:spPr>
+        <p:txBody>
+          <a:bodyPr spcFirstLastPara="1" wrap="square" lIns="68569" tIns="34275" rIns="68569" bIns="34275" anchor="t" anchorCtr="0">
+            <a:normAutofit/>
+          </a:bodyPr>
+          <a:lstStyle/>
+          <a:p>
+            <a:pPr marL="257175" indent="-257175">
+              <a:buClr>
+                <a:schemeClr val="dk1"/>
+              </a:buClr>
+              <a:buSzPts val="3200"/>
+            </a:pPr>
+            <a:endParaRPr sz="2400">
+              <a:solidFill>
+                <a:schemeClr val="dk1"/>
+              </a:solidFill>
+              <a:latin typeface="Calibri"/>
+              <a:ea typeface="Calibri"/>
+              <a:cs typeface="Calibri"/>
+              <a:sym typeface="Calibri"/>
+            </a:endParaRPr>
+          </a:p>
+        </p:txBody>
+      </p:sp>
+      <p:sp>
+        <p:nvSpPr>
+          <p:cNvPr id="205" name="Google Shape;205;p24"/>
+          <p:cNvSpPr txBox="1"/>
+          <p:nvPr/>
+        </p:nvSpPr>
+        <p:spPr>
+          <a:xfrm>
+            <a:off x="1543050" y="3486150"/>
+            <a:ext cx="6172200" cy="571500"/>
+          </a:xfrm>
+          <a:prstGeom prst="rect">
+            <a:avLst/>
+          </a:prstGeom>
+          <a:noFill/>
+          <a:ln>
+            <a:noFill/>
+          </a:ln>
+        </p:spPr>
+        <p:txBody>
+          <a:bodyPr spcFirstLastPara="1" wrap="square" lIns="68569" tIns="34275" rIns="68569" bIns="34275" anchor="ctr" anchorCtr="0">
+            <a:normAutofit/>
+          </a:bodyPr>
+          <a:lstStyle/>
+          <a:p>
+            <a:pPr>
+              <a:buClr>
+                <a:schemeClr val="dk1"/>
+              </a:buClr>
+              <a:buSzPts val="3200"/>
+            </a:pPr>
+            <a:endParaRPr sz="2400">
+              <a:solidFill>
+                <a:schemeClr val="dk1"/>
+              </a:solidFill>
+              <a:latin typeface="Calibri"/>
+              <a:ea typeface="Calibri"/>
+              <a:cs typeface="Calibri"/>
+              <a:sym typeface="Calibri"/>
+            </a:endParaRPr>
+          </a:p>
+        </p:txBody>
+      </p:sp>
+      <p:pic>
+        <p:nvPicPr>
+          <p:cNvPr id="8" name="Picture 7" descr="C:\Users\KrupaShankari\Downloads\Revised_ISE_Logo.png"/>
+          <p:cNvPicPr/>
+          <p:nvPr/>
+        </p:nvPicPr>
+        <p:blipFill>
+          <a:blip r:embed="rId3" cstate="print">
+            <a:extLst>
+              <a:ext uri="{28A0092B-C50C-407E-A947-70E740481C1C}">
+                <a14:useLocalDpi xmlns:a14="http://schemas.microsoft.com/office/drawing/2010/main" val="0"/>
+              </a:ext>
+            </a:extLst>
+          </a:blip>
+          <a:srcRect/>
+          <a:stretch>
+            <a:fillRect/>
+          </a:stretch>
+        </p:blipFill>
+        <p:spPr bwMode="auto">
+          <a:xfrm>
+            <a:off x="1543929" y="321249"/>
+            <a:ext cx="6045591" cy="1113656"/>
+          </a:xfrm>
+          <a:prstGeom prst="rect">
+            <a:avLst/>
+          </a:prstGeom>
+          <a:noFill/>
+          <a:ln>
+            <a:noFill/>
+          </a:ln>
+        </p:spPr>
+      </p:pic>
+    </p:spTree>
+    <p:extLst>
+      <p:ext uri="{BB962C8B-B14F-4D97-AF65-F5344CB8AC3E}">
+        <p14:creationId xmlns:p14="http://schemas.microsoft.com/office/powerpoint/2010/main" val="1360470918"/>
+      </p:ext>
+    </p:extLst>
+  </p:cSld>
+  <p:clrMapOvr>
+    <a:masterClrMapping/>
+  </p:clrMapOvr>
+</p:sld>
+</file>
+
+<file path=ppt/slides/slide13.xml><?xml version="1.0" encoding="utf-8"?>
 <p:sld xmlns:a="http://schemas.openxmlformats.org/drawingml/2006/main" xmlns:r="http://schemas.openxmlformats.org/officeDocument/2006/relationships" xmlns:p="http://schemas.openxmlformats.org/presentationml/2006/main">
   <p:cSld>
     <p:spTree>
@@ -5759,20 +7697,443 @@
           <a:chExt cx="0" cy="0"/>
         </a:xfrm>
       </p:grpSpPr>
+      <p:sp>
+        <p:nvSpPr>
+          <p:cNvPr id="3" name="Google Shape;93;p1"/>
+          <p:cNvSpPr txBox="1"/>
+          <p:nvPr/>
+        </p:nvSpPr>
+        <p:spPr>
+          <a:xfrm>
+            <a:off x="1759912" y="270447"/>
+            <a:ext cx="5515800" cy="477013"/>
+          </a:xfrm>
+          <a:prstGeom prst="rect">
+            <a:avLst/>
+          </a:prstGeom>
+          <a:noFill/>
+          <a:ln>
+            <a:noFill/>
+          </a:ln>
+        </p:spPr>
+        <p:txBody>
+          <a:bodyPr spcFirstLastPara="1" wrap="square" lIns="91425" tIns="45700" rIns="91425" bIns="45700" anchor="t" anchorCtr="0">
+            <a:spAutoFit/>
+          </a:bodyPr>
+          <a:lstStyle/>
+          <a:p>
+            <a:pPr marL="0" marR="0" lvl="0" indent="0" algn="ctr" rtl="0">
+              <a:lnSpc>
+                <a:spcPct val="100000"/>
+              </a:lnSpc>
+              <a:spcBef>
+                <a:spcPts val="0"/>
+              </a:spcBef>
+              <a:spcAft>
+                <a:spcPts val="0"/>
+              </a:spcAft>
+              <a:buNone/>
+            </a:pPr>
+            <a:r>
+              <a:rPr lang="en-IN" sz="2500" b="1" i="0" u="none" strike="noStrike" cap="none" dirty="0" smtClean="0">
+                <a:solidFill>
+                  <a:schemeClr val="dk1"/>
+                </a:solidFill>
+                <a:latin typeface="Montserrat"/>
+                <a:ea typeface="Montserrat"/>
+                <a:cs typeface="Montserrat"/>
+                <a:sym typeface="Montserrat"/>
+              </a:rPr>
+              <a:t>References</a:t>
+            </a:r>
+          </a:p>
+        </p:txBody>
+      </p:sp>
+      <p:sp>
+        <p:nvSpPr>
+          <p:cNvPr id="4" name="Rectangle 3"/>
+          <p:cNvSpPr/>
+          <p:nvPr/>
+        </p:nvSpPr>
+        <p:spPr>
+          <a:xfrm>
+            <a:off x="132079" y="1232463"/>
+            <a:ext cx="8771466" cy="3226524"/>
+          </a:xfrm>
+          <a:prstGeom prst="rect">
+            <a:avLst/>
+          </a:prstGeom>
+        </p:spPr>
+        <p:txBody>
+          <a:bodyPr wrap="square">
+            <a:spAutoFit/>
+          </a:bodyPr>
+          <a:lstStyle/>
+          <a:p>
+            <a:pPr marL="914400" marR="247650" indent="-457200" algn="just">
+              <a:lnSpc>
+                <a:spcPct val="150000"/>
+              </a:lnSpc>
+              <a:spcBef>
+                <a:spcPts val="1000"/>
+              </a:spcBef>
+            </a:pPr>
+            <a:r>
+              <a:rPr lang="en-US" sz="1200" dirty="0">
+                <a:latin typeface="Times New Roman" panose="02020603050405020304" pitchFamily="18" charset="0"/>
+                <a:ea typeface="Times" panose="02020603050405020304" pitchFamily="18" charset="0"/>
+                <a:cs typeface="Times New Roman" panose="02020603050405020304" pitchFamily="18" charset="0"/>
+              </a:rPr>
+              <a:t>[1</a:t>
+            </a:r>
+            <a:r>
+              <a:rPr lang="en-US" sz="1200" dirty="0" smtClean="0">
+                <a:latin typeface="Times New Roman" panose="02020603050405020304" pitchFamily="18" charset="0"/>
+                <a:ea typeface="Times" panose="02020603050405020304" pitchFamily="18" charset="0"/>
+                <a:cs typeface="Times New Roman" panose="02020603050405020304" pitchFamily="18" charset="0"/>
+              </a:rPr>
+              <a:t>] </a:t>
+            </a:r>
+            <a:r>
+              <a:rPr lang="en-US" sz="1200" dirty="0">
+                <a:latin typeface="Times New Roman" panose="02020603050405020304" pitchFamily="18" charset="0"/>
+                <a:ea typeface="Times" panose="02020603050405020304" pitchFamily="18" charset="0"/>
+                <a:cs typeface="Times New Roman" panose="02020603050405020304" pitchFamily="18" charset="0"/>
+              </a:rPr>
+              <a:t>L. </a:t>
+            </a:r>
+            <a:r>
+              <a:rPr lang="en-US" sz="1200" dirty="0" err="1">
+                <a:latin typeface="Times New Roman" panose="02020603050405020304" pitchFamily="18" charset="0"/>
+                <a:ea typeface="Times" panose="02020603050405020304" pitchFamily="18" charset="0"/>
+                <a:cs typeface="Times New Roman" panose="02020603050405020304" pitchFamily="18" charset="0"/>
+              </a:rPr>
+              <a:t>Rajendran</a:t>
+            </a:r>
+            <a:r>
+              <a:rPr lang="en-US" sz="1200" dirty="0">
+                <a:latin typeface="Times New Roman" panose="02020603050405020304" pitchFamily="18" charset="0"/>
+                <a:ea typeface="Times" panose="02020603050405020304" pitchFamily="18" charset="0"/>
+                <a:cs typeface="Times New Roman" panose="02020603050405020304" pitchFamily="18" charset="0"/>
+              </a:rPr>
+              <a:t> , "Real-Time Adaptive Traffic Control System For Smart Cities," International Conference on Computer Communication and Informatics (ICCCI) (IEEE), pp. 1-6, </a:t>
+            </a:r>
+            <a:r>
+              <a:rPr lang="en-US" sz="1200" dirty="0" err="1" smtClean="0">
+                <a:latin typeface="Times New Roman" panose="02020603050405020304" pitchFamily="18" charset="0"/>
+                <a:ea typeface="Times" panose="02020603050405020304" pitchFamily="18" charset="0"/>
+                <a:cs typeface="Times New Roman" panose="02020603050405020304" pitchFamily="18" charset="0"/>
+              </a:rPr>
+              <a:t>doi</a:t>
+            </a:r>
+            <a:r>
+              <a:rPr lang="en-US" sz="1200" dirty="0" smtClean="0">
+                <a:latin typeface="Times New Roman" panose="02020603050405020304" pitchFamily="18" charset="0"/>
+                <a:ea typeface="Times" panose="02020603050405020304" pitchFamily="18" charset="0"/>
+                <a:cs typeface="Times New Roman" panose="02020603050405020304" pitchFamily="18" charset="0"/>
+              </a:rPr>
+              <a:t>: 10.1109/ICCCI50826.2021.9402597</a:t>
+            </a:r>
+            <a:r>
+              <a:rPr lang="en-US" sz="1200" dirty="0">
+                <a:latin typeface="Times New Roman" panose="02020603050405020304" pitchFamily="18" charset="0"/>
+                <a:ea typeface="Times" panose="02020603050405020304" pitchFamily="18" charset="0"/>
+                <a:cs typeface="Times New Roman" panose="02020603050405020304" pitchFamily="18" charset="0"/>
+              </a:rPr>
+              <a:t>, March 2021</a:t>
+            </a:r>
+            <a:r>
+              <a:rPr lang="en-US" sz="1200" dirty="0" smtClean="0">
+                <a:latin typeface="Times New Roman" panose="02020603050405020304" pitchFamily="18" charset="0"/>
+                <a:ea typeface="Times" panose="02020603050405020304" pitchFamily="18" charset="0"/>
+                <a:cs typeface="Times New Roman" panose="02020603050405020304" pitchFamily="18" charset="0"/>
+              </a:rPr>
+              <a:t>.</a:t>
+            </a:r>
+            <a:endParaRPr lang="en-US" sz="1200" dirty="0">
+              <a:latin typeface="Times New Roman" panose="02020603050405020304" pitchFamily="18" charset="0"/>
+              <a:ea typeface="Open Sans"/>
+              <a:cs typeface="Times New Roman" panose="02020603050405020304" pitchFamily="18" charset="0"/>
+            </a:endParaRPr>
+          </a:p>
+          <a:p>
+            <a:pPr marL="914400" marR="247650" indent="-457200" algn="just">
+              <a:lnSpc>
+                <a:spcPct val="150000"/>
+              </a:lnSpc>
+              <a:spcBef>
+                <a:spcPts val="1000"/>
+              </a:spcBef>
+            </a:pPr>
+            <a:r>
+              <a:rPr lang="en-US" sz="1200" dirty="0">
+                <a:latin typeface="Times New Roman" panose="02020603050405020304" pitchFamily="18" charset="0"/>
+                <a:ea typeface="Times" panose="02020603050405020304" pitchFamily="18" charset="0"/>
+                <a:cs typeface="Times New Roman" panose="02020603050405020304" pitchFamily="18" charset="0"/>
+              </a:rPr>
+              <a:t>[2] Sharon, G. Alleviating Road Traffic Congestion with Artificial Intelligence. In IJCAI (pp. 4965-4969), June 2021</a:t>
+            </a:r>
+            <a:r>
+              <a:rPr lang="en-US" sz="1200" dirty="0" smtClean="0">
+                <a:latin typeface="Times New Roman" panose="02020603050405020304" pitchFamily="18" charset="0"/>
+                <a:ea typeface="Times" panose="02020603050405020304" pitchFamily="18" charset="0"/>
+                <a:cs typeface="Times New Roman" panose="02020603050405020304" pitchFamily="18" charset="0"/>
+              </a:rPr>
+              <a:t>.</a:t>
+            </a:r>
+          </a:p>
+          <a:p>
+            <a:pPr marL="914400" marR="247650" indent="-457200" algn="just">
+              <a:lnSpc>
+                <a:spcPct val="150000"/>
+              </a:lnSpc>
+              <a:spcBef>
+                <a:spcPts val="1000"/>
+              </a:spcBef>
+            </a:pPr>
+            <a:r>
+              <a:rPr lang="en-US" sz="1200" dirty="0" smtClean="0">
+                <a:latin typeface="Times New Roman" panose="02020603050405020304" pitchFamily="18" charset="0"/>
+                <a:ea typeface="Open Sans"/>
+                <a:cs typeface="Times New Roman" panose="02020603050405020304" pitchFamily="18" charset="0"/>
+              </a:rPr>
+              <a:t>[3] Jiang</a:t>
+            </a:r>
+            <a:r>
+              <a:rPr lang="en-US" sz="1200" dirty="0">
+                <a:latin typeface="Times New Roman" panose="02020603050405020304" pitchFamily="18" charset="0"/>
+                <a:ea typeface="Open Sans"/>
+                <a:cs typeface="Times New Roman" panose="02020603050405020304" pitchFamily="18" charset="0"/>
+              </a:rPr>
+              <a:t>, </a:t>
+            </a:r>
+            <a:r>
+              <a:rPr lang="en-US" sz="1200" dirty="0" err="1">
+                <a:latin typeface="Times New Roman" panose="02020603050405020304" pitchFamily="18" charset="0"/>
+                <a:ea typeface="Open Sans"/>
+                <a:cs typeface="Times New Roman" panose="02020603050405020304" pitchFamily="18" charset="0"/>
+              </a:rPr>
+              <a:t>Peiyuan</a:t>
+            </a:r>
+            <a:r>
+              <a:rPr lang="en-US" sz="1200" dirty="0">
+                <a:latin typeface="Times New Roman" panose="02020603050405020304" pitchFamily="18" charset="0"/>
+                <a:ea typeface="Open Sans"/>
+                <a:cs typeface="Times New Roman" panose="02020603050405020304" pitchFamily="18" charset="0"/>
+              </a:rPr>
+              <a:t>, et al. "A Review of Yolo algorithm developments." </a:t>
+            </a:r>
+            <a:r>
+              <a:rPr lang="en-US" sz="1200" dirty="0" err="1">
+                <a:latin typeface="Times New Roman" panose="02020603050405020304" pitchFamily="18" charset="0"/>
+                <a:ea typeface="Open Sans"/>
+                <a:cs typeface="Times New Roman" panose="02020603050405020304" pitchFamily="18" charset="0"/>
+              </a:rPr>
+              <a:t>Procedia</a:t>
+            </a:r>
+            <a:r>
+              <a:rPr lang="en-US" sz="1200" dirty="0">
+                <a:latin typeface="Times New Roman" panose="02020603050405020304" pitchFamily="18" charset="0"/>
+                <a:ea typeface="Open Sans"/>
+                <a:cs typeface="Times New Roman" panose="02020603050405020304" pitchFamily="18" charset="0"/>
+              </a:rPr>
+              <a:t> Computer Science 199 (2022): 1066-1073</a:t>
+            </a:r>
+            <a:r>
+              <a:rPr lang="en-US" sz="1200" dirty="0" smtClean="0">
+                <a:latin typeface="Times New Roman" panose="02020603050405020304" pitchFamily="18" charset="0"/>
+                <a:ea typeface="Open Sans"/>
+                <a:cs typeface="Times New Roman" panose="02020603050405020304" pitchFamily="18" charset="0"/>
+              </a:rPr>
+              <a:t>.</a:t>
+            </a:r>
+            <a:endParaRPr lang="en-US" sz="1200" dirty="0">
+              <a:latin typeface="Times New Roman" panose="02020603050405020304" pitchFamily="18" charset="0"/>
+              <a:ea typeface="Open Sans"/>
+              <a:cs typeface="Times New Roman" panose="02020603050405020304" pitchFamily="18" charset="0"/>
+            </a:endParaRPr>
+          </a:p>
+          <a:p>
+            <a:pPr marL="914400" marR="247650" indent="-457200" algn="just">
+              <a:lnSpc>
+                <a:spcPct val="150000"/>
+              </a:lnSpc>
+              <a:spcBef>
+                <a:spcPts val="1000"/>
+              </a:spcBef>
+            </a:pPr>
+            <a:r>
+              <a:rPr lang="en-US" sz="1200" dirty="0" smtClean="0">
+                <a:latin typeface="Times New Roman" panose="02020603050405020304" pitchFamily="18" charset="0"/>
+                <a:ea typeface="Open Sans"/>
+                <a:cs typeface="Times New Roman" panose="02020603050405020304" pitchFamily="18" charset="0"/>
+              </a:rPr>
+              <a:t>[4] Kong</a:t>
+            </a:r>
+            <a:r>
+              <a:rPr lang="en-US" sz="1200" dirty="0">
+                <a:latin typeface="Times New Roman" panose="02020603050405020304" pitchFamily="18" charset="0"/>
+                <a:ea typeface="Open Sans"/>
+                <a:cs typeface="Times New Roman" panose="02020603050405020304" pitchFamily="18" charset="0"/>
+              </a:rPr>
+              <a:t>, </a:t>
+            </a:r>
+            <a:r>
+              <a:rPr lang="en-US" sz="1200" dirty="0" err="1">
+                <a:latin typeface="Times New Roman" panose="02020603050405020304" pitchFamily="18" charset="0"/>
+                <a:ea typeface="Open Sans"/>
+                <a:cs typeface="Times New Roman" panose="02020603050405020304" pitchFamily="18" charset="0"/>
+              </a:rPr>
+              <a:t>Xiangjie</a:t>
+            </a:r>
+            <a:r>
+              <a:rPr lang="en-US" sz="1200" dirty="0">
+                <a:latin typeface="Times New Roman" panose="02020603050405020304" pitchFamily="18" charset="0"/>
+                <a:ea typeface="Open Sans"/>
+                <a:cs typeface="Times New Roman" panose="02020603050405020304" pitchFamily="18" charset="0"/>
+              </a:rPr>
+              <a:t>, et al. "Urban traffic congestion estimation and prediction based on floating car trajectory data." Future Generation Computer Systems 61 (2016): </a:t>
+            </a:r>
+            <a:r>
+              <a:rPr lang="en-US" sz="1200" dirty="0" smtClean="0">
+                <a:latin typeface="Times New Roman" panose="02020603050405020304" pitchFamily="18" charset="0"/>
+                <a:ea typeface="Open Sans"/>
+                <a:cs typeface="Times New Roman" panose="02020603050405020304" pitchFamily="18" charset="0"/>
+              </a:rPr>
+              <a:t>97-107</a:t>
+            </a:r>
+            <a:endParaRPr lang="en-US" sz="1200" dirty="0">
+              <a:latin typeface="Times New Roman" panose="02020603050405020304" pitchFamily="18" charset="0"/>
+              <a:ea typeface="Open Sans"/>
+              <a:cs typeface="Times New Roman" panose="02020603050405020304" pitchFamily="18" charset="0"/>
+            </a:endParaRPr>
+          </a:p>
+          <a:p>
+            <a:pPr marL="914400" marR="247650" indent="-457200" algn="just">
+              <a:lnSpc>
+                <a:spcPct val="150000"/>
+              </a:lnSpc>
+              <a:spcBef>
+                <a:spcPts val="1000"/>
+              </a:spcBef>
+            </a:pPr>
+            <a:r>
+              <a:rPr lang="en-US" sz="1200" dirty="0" smtClean="0">
+                <a:latin typeface="Times New Roman" panose="02020603050405020304" pitchFamily="18" charset="0"/>
+                <a:ea typeface="Times" panose="02020603050405020304" pitchFamily="18" charset="0"/>
+                <a:cs typeface="Times New Roman" panose="02020603050405020304" pitchFamily="18" charset="0"/>
+              </a:rPr>
+              <a:t>[5] </a:t>
+            </a:r>
+            <a:r>
+              <a:rPr lang="en-US" sz="1200" dirty="0" err="1">
+                <a:latin typeface="Times New Roman" panose="02020603050405020304" pitchFamily="18" charset="0"/>
+                <a:ea typeface="Times" panose="02020603050405020304" pitchFamily="18" charset="0"/>
+                <a:cs typeface="Times New Roman" panose="02020603050405020304" pitchFamily="18" charset="0"/>
+              </a:rPr>
+              <a:t>Arnott</a:t>
+            </a:r>
+            <a:r>
+              <a:rPr lang="en-US" sz="1200" dirty="0">
+                <a:latin typeface="Times New Roman" panose="02020603050405020304" pitchFamily="18" charset="0"/>
+                <a:ea typeface="Times" panose="02020603050405020304" pitchFamily="18" charset="0"/>
+                <a:cs typeface="Times New Roman" panose="02020603050405020304" pitchFamily="18" charset="0"/>
+              </a:rPr>
+              <a:t>, R., &amp; Small, K. The economics of traffic congestion. American Scientist, 82(5), 446-455. </a:t>
+            </a:r>
+            <a:r>
+              <a:rPr lang="en-US" sz="1200" dirty="0" smtClean="0">
+                <a:latin typeface="Times New Roman" panose="02020603050405020304" pitchFamily="18" charset="0"/>
+                <a:ea typeface="Times" panose="02020603050405020304" pitchFamily="18" charset="0"/>
+                <a:cs typeface="Times New Roman" panose="02020603050405020304" pitchFamily="18" charset="0"/>
+              </a:rPr>
+              <a:t>1994.</a:t>
+            </a:r>
+            <a:endParaRPr lang="en-US" sz="1200" dirty="0">
+              <a:latin typeface="Times New Roman" panose="02020603050405020304" pitchFamily="18" charset="0"/>
+              <a:ea typeface="Times" panose="02020603050405020304" pitchFamily="18" charset="0"/>
+              <a:cs typeface="Times New Roman" panose="02020603050405020304" pitchFamily="18" charset="0"/>
+            </a:endParaRPr>
+          </a:p>
+          <a:p>
+            <a:pPr marL="914400" marR="247650" indent="-457200" algn="just">
+              <a:lnSpc>
+                <a:spcPct val="150000"/>
+              </a:lnSpc>
+              <a:spcBef>
+                <a:spcPts val="1000"/>
+              </a:spcBef>
+            </a:pPr>
+            <a:r>
+              <a:rPr lang="en-US" sz="1200" dirty="0" smtClean="0">
+                <a:latin typeface="Times New Roman" panose="02020603050405020304" pitchFamily="18" charset="0"/>
+                <a:ea typeface="Times" panose="02020603050405020304" pitchFamily="18" charset="0"/>
+                <a:cs typeface="Times New Roman" panose="02020603050405020304" pitchFamily="18" charset="0"/>
+              </a:rPr>
+              <a:t>[6] </a:t>
+            </a:r>
+            <a:r>
+              <a:rPr lang="en-US" sz="1200" dirty="0" err="1">
+                <a:latin typeface="Times New Roman" panose="02020603050405020304" pitchFamily="18" charset="0"/>
+                <a:ea typeface="Times" panose="02020603050405020304" pitchFamily="18" charset="0"/>
+                <a:cs typeface="Times New Roman" panose="02020603050405020304" pitchFamily="18" charset="0"/>
+              </a:rPr>
+              <a:t>Mihir</a:t>
+            </a:r>
+            <a:r>
+              <a:rPr lang="en-US" sz="1200" dirty="0">
+                <a:latin typeface="Times New Roman" panose="02020603050405020304" pitchFamily="18" charset="0"/>
+                <a:ea typeface="Times" panose="02020603050405020304" pitchFamily="18" charset="0"/>
+                <a:cs typeface="Times New Roman" panose="02020603050405020304" pitchFamily="18" charset="0"/>
+              </a:rPr>
+              <a:t> Gandhi. </a:t>
+            </a:r>
+            <a:r>
+              <a:rPr lang="en-US" sz="1200" i="1" dirty="0">
+                <a:latin typeface="Times New Roman" panose="02020603050405020304" pitchFamily="18" charset="0"/>
+                <a:ea typeface="Times" panose="02020603050405020304" pitchFamily="18" charset="0"/>
+                <a:cs typeface="Times New Roman" panose="02020603050405020304" pitchFamily="18" charset="0"/>
+              </a:rPr>
+              <a:t>Smart Control of Traffic Light System using Artificial Intelligence</a:t>
+            </a:r>
+            <a:r>
+              <a:rPr lang="en-US" sz="1200" dirty="0">
+                <a:latin typeface="Times New Roman" panose="02020603050405020304" pitchFamily="18" charset="0"/>
+                <a:ea typeface="Times" panose="02020603050405020304" pitchFamily="18" charset="0"/>
+                <a:cs typeface="Times New Roman" panose="02020603050405020304" pitchFamily="18" charset="0"/>
+              </a:rPr>
+              <a:t> [Video]. YouTube. https://youtu.be/OssY5pzOyo0. May 2020</a:t>
+            </a:r>
+            <a:endParaRPr lang="en-US" sz="1200" dirty="0">
+              <a:effectLst/>
+              <a:latin typeface="Times New Roman" panose="02020603050405020304" pitchFamily="18" charset="0"/>
+              <a:ea typeface="Open Sans"/>
+              <a:cs typeface="Times New Roman" panose="02020603050405020304" pitchFamily="18" charset="0"/>
+            </a:endParaRPr>
+          </a:p>
+        </p:txBody>
+      </p:sp>
     </p:spTree>
     <p:extLst>
       <p:ext uri="{BB962C8B-B14F-4D97-AF65-F5344CB8AC3E}">
-        <p14:creationId xmlns:p14="http://schemas.microsoft.com/office/powerpoint/2010/main" val="24112167"/>
+        <p14:creationId xmlns:p14="http://schemas.microsoft.com/office/powerpoint/2010/main" val="3364439372"/>
       </p:ext>
     </p:extLst>
   </p:cSld>
   <p:clrMapOvr>
     <a:masterClrMapping/>
   </p:clrMapOvr>
+  <p:timing>
+    <p:tnLst>
+      <p:par>
+        <p:cTn id="1" dur="indefinite" restart="never" nodeType="tmRoot"/>
+      </p:par>
+    </p:tnLst>
+  </p:timing>
 </p:sld>
 </file>
 
-<file path=ppt/slides/slide3.xml><?xml version="1.0" encoding="utf-8"?>
+<file path=ppt/slides/slide14.xml><?xml version="1.0" encoding="utf-8"?>
 <p:sld xmlns:a="http://schemas.openxmlformats.org/drawingml/2006/main" xmlns:r="http://schemas.openxmlformats.org/officeDocument/2006/relationships" xmlns:p="http://schemas.openxmlformats.org/presentationml/2006/main">
   <p:cSld>
     <p:spTree>
@@ -5791,20 +8152,65 @@
       </p:grpSpPr>
       <p:sp>
         <p:nvSpPr>
-          <p:cNvPr id="2" name="Slide Number Placeholder 1"/>
+          <p:cNvPr id="2" name="Title 1"/>
           <p:cNvSpPr>
             <a:spLocks noGrp="1"/>
           </p:cNvSpPr>
           <p:nvPr>
-            <p:ph type="sldNum" sz="quarter" idx="12"/>
-          </p:nvPr>
-        </p:nvSpPr>
-        <p:spPr/>
-        <p:txBody>
-          <a:bodyPr/>
+            <p:ph type="title"/>
+          </p:nvPr>
+        </p:nvSpPr>
+        <p:spPr>
+          <a:xfrm>
+            <a:off x="682836" y="2475178"/>
+            <a:ext cx="7886700" cy="994172"/>
+          </a:xfrm>
+        </p:spPr>
+        <p:txBody>
+          <a:bodyPr>
+            <a:noAutofit/>
+          </a:bodyPr>
           <a:lstStyle/>
           <a:p>
-            <a:pPr marL="0" lvl="0" indent="0" algn="r" rtl="0">
+            <a:pPr algn="ctr"/>
+            <a:r>
+              <a:rPr lang="en-IN" sz="8800" b="1" dirty="0" smtClean="0">
+                <a:latin typeface="Montserrat" panose="020B0604020202020204" charset="0"/>
+              </a:rPr>
+              <a:t>Thank You</a:t>
+            </a:r>
+            <a:endParaRPr lang="en-US" sz="8800" b="1" dirty="0">
+              <a:latin typeface="Montserrat" panose="020B0604020202020204" charset="0"/>
+            </a:endParaRPr>
+          </a:p>
+        </p:txBody>
+      </p:sp>
+      <p:sp>
+        <p:nvSpPr>
+          <p:cNvPr id="4" name="Google Shape;98;p1"/>
+          <p:cNvSpPr txBox="1"/>
+          <p:nvPr/>
+        </p:nvSpPr>
+        <p:spPr>
+          <a:xfrm>
+            <a:off x="1243957" y="208678"/>
+            <a:ext cx="6579900" cy="1084565"/>
+          </a:xfrm>
+          <a:prstGeom prst="rect">
+            <a:avLst/>
+          </a:prstGeom>
+          <a:noFill/>
+          <a:ln>
+            <a:noFill/>
+          </a:ln>
+        </p:spPr>
+        <p:txBody>
+          <a:bodyPr spcFirstLastPara="1" wrap="square" lIns="91425" tIns="91425" rIns="91425" bIns="91425" anchor="t" anchorCtr="0">
+            <a:noAutofit/>
+          </a:bodyPr>
+          <a:lstStyle/>
+          <a:p>
+            <a:pPr marL="0" lvl="0" indent="0" algn="l" rtl="0">
               <a:spcBef>
                 <a:spcPts val="0"/>
               </a:spcBef>
@@ -5813,18 +8219,1625 @@
               </a:spcAft>
               <a:buNone/>
             </a:pPr>
-            <a:fld id="{00000000-1234-1234-1234-123412341234}" type="slidenum">
-              <a:rPr lang="en-US" smtClean="0"/>
-              <a:t>3</a:t>
-            </a:fld>
-            <a:endParaRPr lang="en-US"/>
-          </a:p>
-        </p:txBody>
-      </p:sp>
+            <a:r>
+              <a:rPr lang="en-US" sz="1200" b="1" dirty="0">
+                <a:solidFill>
+                  <a:schemeClr val="tx1">
+                    <a:lumMod val="65000"/>
+                    <a:lumOff val="35000"/>
+                  </a:schemeClr>
+                </a:solidFill>
+                <a:latin typeface="Montserrat"/>
+                <a:ea typeface="Montserrat"/>
+                <a:cs typeface="Montserrat"/>
+                <a:sym typeface="Montserrat"/>
+              </a:rPr>
+              <a:t>DAYANANDA SAGAR COLLEGE OF ENGINEERING</a:t>
+            </a:r>
+            <a:endParaRPr sz="1200" b="1" dirty="0">
+              <a:solidFill>
+                <a:schemeClr val="tx1">
+                  <a:lumMod val="65000"/>
+                  <a:lumOff val="35000"/>
+                </a:schemeClr>
+              </a:solidFill>
+              <a:latin typeface="Montserrat"/>
+              <a:ea typeface="Montserrat"/>
+              <a:cs typeface="Montserrat"/>
+              <a:sym typeface="Montserrat"/>
+            </a:endParaRPr>
+          </a:p>
+          <a:p>
+            <a:pPr marL="0" lvl="0" indent="0" algn="l" rtl="0">
+              <a:spcBef>
+                <a:spcPts val="0"/>
+              </a:spcBef>
+              <a:spcAft>
+                <a:spcPts val="0"/>
+              </a:spcAft>
+              <a:buNone/>
+            </a:pPr>
+            <a:r>
+              <a:rPr lang="en-US" sz="1000" dirty="0" err="1">
+                <a:solidFill>
+                  <a:schemeClr val="tx1">
+                    <a:lumMod val="65000"/>
+                    <a:lumOff val="35000"/>
+                  </a:schemeClr>
+                </a:solidFill>
+                <a:latin typeface="Montserrat Medium"/>
+                <a:ea typeface="Montserrat Medium"/>
+                <a:cs typeface="Montserrat Medium"/>
+                <a:sym typeface="Montserrat Medium"/>
+              </a:rPr>
+              <a:t>Malleshwara</a:t>
+            </a:r>
+            <a:r>
+              <a:rPr lang="en-US" sz="1000" dirty="0">
+                <a:solidFill>
+                  <a:schemeClr val="tx1">
+                    <a:lumMod val="65000"/>
+                    <a:lumOff val="35000"/>
+                  </a:schemeClr>
+                </a:solidFill>
+                <a:latin typeface="Montserrat Medium"/>
+                <a:ea typeface="Montserrat Medium"/>
+                <a:cs typeface="Montserrat Medium"/>
+                <a:sym typeface="Montserrat Medium"/>
+              </a:rPr>
+              <a:t> Hills, </a:t>
+            </a:r>
+            <a:r>
+              <a:rPr lang="en-US" sz="1000" dirty="0" err="1">
+                <a:solidFill>
+                  <a:schemeClr val="tx1">
+                    <a:lumMod val="65000"/>
+                    <a:lumOff val="35000"/>
+                  </a:schemeClr>
+                </a:solidFill>
+                <a:latin typeface="Montserrat Medium"/>
+                <a:ea typeface="Montserrat Medium"/>
+                <a:cs typeface="Montserrat Medium"/>
+                <a:sym typeface="Montserrat Medium"/>
+              </a:rPr>
+              <a:t>Kumarswamy</a:t>
+            </a:r>
+            <a:r>
+              <a:rPr lang="en-US" sz="1000" dirty="0">
+                <a:solidFill>
+                  <a:schemeClr val="tx1">
+                    <a:lumMod val="65000"/>
+                    <a:lumOff val="35000"/>
+                  </a:schemeClr>
+                </a:solidFill>
+                <a:latin typeface="Montserrat Medium"/>
+                <a:ea typeface="Montserrat Medium"/>
+                <a:cs typeface="Montserrat Medium"/>
+                <a:sym typeface="Montserrat Medium"/>
+              </a:rPr>
+              <a:t> Layout, Bangalore - 560111</a:t>
+            </a:r>
+            <a:endParaRPr sz="1000" dirty="0">
+              <a:solidFill>
+                <a:schemeClr val="tx1">
+                  <a:lumMod val="65000"/>
+                  <a:lumOff val="35000"/>
+                </a:schemeClr>
+              </a:solidFill>
+              <a:latin typeface="Montserrat Medium"/>
+              <a:ea typeface="Montserrat Medium"/>
+              <a:cs typeface="Montserrat Medium"/>
+              <a:sym typeface="Montserrat Medium"/>
+            </a:endParaRPr>
+          </a:p>
+          <a:p>
+            <a:pPr marL="0" lvl="0" indent="0" algn="l" rtl="0">
+              <a:spcBef>
+                <a:spcPts val="0"/>
+              </a:spcBef>
+              <a:spcAft>
+                <a:spcPts val="0"/>
+              </a:spcAft>
+              <a:buNone/>
+            </a:pPr>
+            <a:r>
+              <a:rPr lang="en-US" sz="1100" dirty="0">
+                <a:solidFill>
+                  <a:schemeClr val="tx1">
+                    <a:lumMod val="65000"/>
+                    <a:lumOff val="35000"/>
+                  </a:schemeClr>
+                </a:solidFill>
+                <a:latin typeface="Montserrat"/>
+                <a:ea typeface="Montserrat"/>
+                <a:cs typeface="Montserrat"/>
+                <a:sym typeface="Montserrat"/>
+              </a:rPr>
+              <a:t>Department of Information Science and Engineering</a:t>
+            </a:r>
+            <a:endParaRPr sz="1100" dirty="0">
+              <a:solidFill>
+                <a:schemeClr val="tx1">
+                  <a:lumMod val="65000"/>
+                  <a:lumOff val="35000"/>
+                </a:schemeClr>
+              </a:solidFill>
+              <a:latin typeface="Montserrat"/>
+              <a:ea typeface="Montserrat"/>
+              <a:cs typeface="Montserrat"/>
+              <a:sym typeface="Montserrat"/>
+            </a:endParaRPr>
+          </a:p>
+        </p:txBody>
+      </p:sp>
+      <p:pic>
+        <p:nvPicPr>
+          <p:cNvPr id="5" name="Google Shape;97;p1"/>
+          <p:cNvPicPr preferRelativeResize="0"/>
+          <p:nvPr/>
+        </p:nvPicPr>
+        <p:blipFill>
+          <a:blip r:embed="rId2">
+            <a:alphaModFix/>
+          </a:blip>
+          <a:stretch>
+            <a:fillRect/>
+          </a:stretch>
+        </p:blipFill>
+        <p:spPr>
+          <a:xfrm>
+            <a:off x="377048" y="208678"/>
+            <a:ext cx="754098" cy="746362"/>
+          </a:xfrm>
+          <a:prstGeom prst="rect">
+            <a:avLst/>
+          </a:prstGeom>
+          <a:noFill/>
+          <a:ln>
+            <a:noFill/>
+          </a:ln>
+        </p:spPr>
+      </p:pic>
     </p:spTree>
     <p:extLst>
       <p:ext uri="{BB962C8B-B14F-4D97-AF65-F5344CB8AC3E}">
-        <p14:creationId xmlns:p14="http://schemas.microsoft.com/office/powerpoint/2010/main" val="3364439372"/>
+        <p14:creationId xmlns:p14="http://schemas.microsoft.com/office/powerpoint/2010/main" val="1678983773"/>
+      </p:ext>
+    </p:extLst>
+  </p:cSld>
+  <p:clrMapOvr>
+    <a:masterClrMapping/>
+  </p:clrMapOvr>
+  <p:timing>
+    <p:tnLst>
+      <p:par>
+        <p:cTn id="1" dur="indefinite" restart="never" nodeType="tmRoot"/>
+      </p:par>
+    </p:tnLst>
+  </p:timing>
+</p:sld>
+</file>
+
+<file path=ppt/slides/slide2.xml><?xml version="1.0" encoding="utf-8"?>
+<p:sld xmlns:a="http://schemas.openxmlformats.org/drawingml/2006/main" xmlns:r="http://schemas.openxmlformats.org/officeDocument/2006/relationships" xmlns:p="http://schemas.openxmlformats.org/presentationml/2006/main">
+  <p:cSld>
+    <p:spTree>
+      <p:nvGrpSpPr>
+        <p:cNvPr id="1" name="Shape 98"/>
+        <p:cNvGrpSpPr/>
+        <p:nvPr/>
+      </p:nvGrpSpPr>
+      <p:grpSpPr>
+        <a:xfrm>
+          <a:off x="0" y="0"/>
+          <a:ext cx="0" cy="0"/>
+          <a:chOff x="0" y="0"/>
+          <a:chExt cx="0" cy="0"/>
+        </a:xfrm>
+      </p:grpSpPr>
+      <p:sp>
+        <p:nvSpPr>
+          <p:cNvPr id="99" name="Google Shape;99;p14"/>
+          <p:cNvSpPr txBox="1">
+            <a:spLocks noGrp="1"/>
+          </p:cNvSpPr>
+          <p:nvPr>
+            <p:ph type="title"/>
+          </p:nvPr>
+        </p:nvSpPr>
+        <p:spPr>
+          <a:xfrm>
+            <a:off x="1543050" y="392906"/>
+            <a:ext cx="6172200" cy="514350"/>
+          </a:xfrm>
+          <a:prstGeom prst="rect">
+            <a:avLst/>
+          </a:prstGeom>
+          <a:noFill/>
+          <a:ln>
+            <a:noFill/>
+          </a:ln>
+        </p:spPr>
+        <p:txBody>
+          <a:bodyPr spcFirstLastPara="1" vert="horz" wrap="square" lIns="68569" tIns="34275" rIns="68569" bIns="34275" rtlCol="0" anchor="ctr" anchorCtr="0">
+            <a:normAutofit/>
+          </a:bodyPr>
+          <a:lstStyle/>
+          <a:p>
+            <a:pPr algn="ctr">
+              <a:spcBef>
+                <a:spcPts val="0"/>
+              </a:spcBef>
+              <a:buClr>
+                <a:schemeClr val="dk1"/>
+              </a:buClr>
+              <a:buSzPts val="3200"/>
+            </a:pPr>
+            <a:r>
+              <a:rPr lang="en-US" sz="2400" b="1" dirty="0">
+                <a:latin typeface="Montserrat" panose="020B0604020202020204" charset="0"/>
+              </a:rPr>
+              <a:t>ABSTRACT</a:t>
+            </a:r>
+            <a:endParaRPr sz="2400" b="1" dirty="0">
+              <a:latin typeface="Montserrat" panose="020B0604020202020204" charset="0"/>
+            </a:endParaRPr>
+          </a:p>
+        </p:txBody>
+      </p:sp>
+      <p:sp>
+        <p:nvSpPr>
+          <p:cNvPr id="104" name="Google Shape;104;p14"/>
+          <p:cNvSpPr txBox="1"/>
+          <p:nvPr/>
+        </p:nvSpPr>
+        <p:spPr>
+          <a:xfrm>
+            <a:off x="1543050" y="3486150"/>
+            <a:ext cx="6172200" cy="571500"/>
+          </a:xfrm>
+          <a:prstGeom prst="rect">
+            <a:avLst/>
+          </a:prstGeom>
+          <a:noFill/>
+          <a:ln>
+            <a:noFill/>
+          </a:ln>
+        </p:spPr>
+        <p:txBody>
+          <a:bodyPr spcFirstLastPara="1" wrap="square" lIns="68569" tIns="34275" rIns="68569" bIns="34275" anchor="ctr" anchorCtr="0">
+            <a:normAutofit/>
+          </a:bodyPr>
+          <a:lstStyle/>
+          <a:p>
+            <a:pPr>
+              <a:buClr>
+                <a:schemeClr val="dk1"/>
+              </a:buClr>
+              <a:buSzPts val="3200"/>
+            </a:pPr>
+            <a:endParaRPr sz="2400">
+              <a:solidFill>
+                <a:schemeClr val="dk1"/>
+              </a:solidFill>
+              <a:latin typeface="Calibri"/>
+              <a:ea typeface="Calibri"/>
+              <a:cs typeface="Calibri"/>
+              <a:sym typeface="Calibri"/>
+            </a:endParaRPr>
+          </a:p>
+        </p:txBody>
+      </p:sp>
+      <p:sp>
+        <p:nvSpPr>
+          <p:cNvPr id="2" name="Rectangle 1"/>
+          <p:cNvSpPr/>
+          <p:nvPr/>
+        </p:nvSpPr>
+        <p:spPr>
+          <a:xfrm>
+            <a:off x="514350" y="1595437"/>
+            <a:ext cx="8229600" cy="2462213"/>
+          </a:xfrm>
+          <a:prstGeom prst="rect">
+            <a:avLst/>
+          </a:prstGeom>
+        </p:spPr>
+        <p:txBody>
+          <a:bodyPr wrap="square">
+            <a:spAutoFit/>
+          </a:bodyPr>
+          <a:lstStyle/>
+          <a:p>
+            <a:pPr marL="457200" marR="190500" algn="just">
+              <a:spcBef>
+                <a:spcPts val="1000"/>
+              </a:spcBef>
+            </a:pPr>
+            <a:r>
+              <a:rPr lang="en-US" dirty="0">
+                <a:latin typeface="Times New Roman" panose="02020603050405020304" pitchFamily="18" charset="0"/>
+                <a:ea typeface="Open Sans"/>
+                <a:cs typeface="Open Sans"/>
+              </a:rPr>
+              <a:t>The optimization of the existing traffic light system represents a critical step toward mitigating urban traffic-related issues. By integrating advanced methodologies and technologies discussed in [1], we aim to alleviate the challenges posed by the conventional traffic control system. The inadequacies of the current system become evident in its limited adaptability to real-time traffic conditions and its lack of consideration for various factors such as traffic volume, patterns, and emergency vehicle prioritization. This deficiency leads to prolonged travel times for commuters and jeopardizes the timely response of emergency services, potentially endangering lives. Our project introduces a dynamic traffic management approach, utilizing real-time data to adjust signal timings according to the changing traffic density. By doing so, we anticipate a significant reduction in traffic, shorter travel durations, and an overall enhancement in the quality of life for urban residents. The project's positive outcomes extend beyond individual commuters to encompass the broader community and local </a:t>
+            </a:r>
+            <a:r>
+              <a:rPr lang="en-US" dirty="0" smtClean="0">
+                <a:latin typeface="Times New Roman" panose="02020603050405020304" pitchFamily="18" charset="0"/>
+                <a:ea typeface="Open Sans"/>
+                <a:cs typeface="Open Sans"/>
+              </a:rPr>
+              <a:t>authorities</a:t>
+            </a:r>
+            <a:endParaRPr lang="en-US" sz="1200" dirty="0">
+              <a:effectLst/>
+              <a:latin typeface="Open Sans"/>
+              <a:ea typeface="Open Sans"/>
+              <a:cs typeface="Open Sans"/>
+            </a:endParaRPr>
+          </a:p>
+        </p:txBody>
+      </p:sp>
+    </p:spTree>
+    <p:extLst>
+      <p:ext uri="{BB962C8B-B14F-4D97-AF65-F5344CB8AC3E}">
+        <p14:creationId xmlns:p14="http://schemas.microsoft.com/office/powerpoint/2010/main" val="551971054"/>
+      </p:ext>
+    </p:extLst>
+  </p:cSld>
+  <p:clrMapOvr>
+    <a:masterClrMapping/>
+  </p:clrMapOvr>
+</p:sld>
+</file>
+
+<file path=ppt/slides/slide3.xml><?xml version="1.0" encoding="utf-8"?>
+<p:sld xmlns:a="http://schemas.openxmlformats.org/drawingml/2006/main" xmlns:r="http://schemas.openxmlformats.org/officeDocument/2006/relationships" xmlns:p="http://schemas.openxmlformats.org/presentationml/2006/main">
+  <p:cSld>
+    <p:spTree>
+      <p:nvGrpSpPr>
+        <p:cNvPr id="1" name="Shape 108"/>
+        <p:cNvGrpSpPr/>
+        <p:nvPr/>
+      </p:nvGrpSpPr>
+      <p:grpSpPr>
+        <a:xfrm>
+          <a:off x="0" y="0"/>
+          <a:ext cx="0" cy="0"/>
+          <a:chOff x="0" y="0"/>
+          <a:chExt cx="0" cy="0"/>
+        </a:xfrm>
+      </p:grpSpPr>
+      <p:sp>
+        <p:nvSpPr>
+          <p:cNvPr id="109" name="Google Shape;109;p15"/>
+          <p:cNvSpPr txBox="1">
+            <a:spLocks noGrp="1"/>
+          </p:cNvSpPr>
+          <p:nvPr>
+            <p:ph type="title"/>
+          </p:nvPr>
+        </p:nvSpPr>
+        <p:spPr>
+          <a:xfrm>
+            <a:off x="1543050" y="367295"/>
+            <a:ext cx="6172200" cy="514350"/>
+          </a:xfrm>
+          <a:prstGeom prst="rect">
+            <a:avLst/>
+          </a:prstGeom>
+          <a:noFill/>
+          <a:ln>
+            <a:noFill/>
+          </a:ln>
+        </p:spPr>
+        <p:txBody>
+          <a:bodyPr spcFirstLastPara="1" vert="horz" wrap="square" lIns="68569" tIns="34275" rIns="68569" bIns="34275" rtlCol="0" anchor="ctr" anchorCtr="0">
+            <a:normAutofit/>
+          </a:bodyPr>
+          <a:lstStyle/>
+          <a:p>
+            <a:pPr algn="ctr">
+              <a:spcBef>
+                <a:spcPts val="0"/>
+              </a:spcBef>
+              <a:buClr>
+                <a:schemeClr val="dk1"/>
+              </a:buClr>
+              <a:buSzPts val="3200"/>
+            </a:pPr>
+            <a:r>
+              <a:rPr lang="en-US" sz="2400" b="1" dirty="0">
+                <a:latin typeface="Montserrat" panose="020B0604020202020204" charset="0"/>
+              </a:rPr>
+              <a:t>INTRODUCTION</a:t>
+            </a:r>
+            <a:endParaRPr sz="2400" b="1" dirty="0">
+              <a:latin typeface="Montserrat" panose="020B0604020202020204" charset="0"/>
+            </a:endParaRPr>
+          </a:p>
+        </p:txBody>
+      </p:sp>
+      <p:sp>
+        <p:nvSpPr>
+          <p:cNvPr id="113" name="Google Shape;113;p15"/>
+          <p:cNvSpPr txBox="1"/>
+          <p:nvPr/>
+        </p:nvSpPr>
+        <p:spPr>
+          <a:xfrm>
+            <a:off x="1188297" y="1493626"/>
+            <a:ext cx="7007437" cy="2343150"/>
+          </a:xfrm>
+          <a:prstGeom prst="rect">
+            <a:avLst/>
+          </a:prstGeom>
+          <a:noFill/>
+          <a:ln>
+            <a:noFill/>
+          </a:ln>
+        </p:spPr>
+        <p:txBody>
+          <a:bodyPr spcFirstLastPara="1" wrap="square" lIns="68569" tIns="34275" rIns="68569" bIns="34275" anchor="t" anchorCtr="0">
+            <a:noAutofit/>
+          </a:bodyPr>
+          <a:lstStyle/>
+          <a:p>
+            <a:pPr algn="just"/>
+            <a:r>
+              <a:rPr lang="en-US" dirty="0">
+                <a:latin typeface="Times New Roman" panose="02020603050405020304" pitchFamily="18" charset="0"/>
+                <a:cs typeface="Times New Roman" panose="02020603050405020304" pitchFamily="18" charset="0"/>
+              </a:rPr>
+              <a:t>The number of vehicles on the road are increasing day by day so it is important to manage the traffic flow efficiently in order to utilize the existing road capacity in the best way possible. Developing a smart traffic management system to optimize traffic flow, reduce congestion, while minimizing the travel time and maximizing mobility. Installation of traffic signals can actually cause a deterioration in overall safety of intersections. Time traffic signals can cause a situation of deadlock. Metro cities and many majorly populated cities have traffic signals at very short distances which prevent the smooth flow of traffic. Severe traffic can cause phantom traffic jams. The present automated traffic control systems work on time-based algorithms. Each lane is allotted a fixed time for traffic to clear off, the times may be equal for all lanes or based on the average vehicle density.</a:t>
+            </a:r>
+          </a:p>
+          <a:p>
+            <a:pPr algn="just"/>
+            <a:r>
+              <a:rPr lang="en-US" dirty="0">
+                <a:latin typeface="Times New Roman" panose="02020603050405020304" pitchFamily="18" charset="0"/>
+                <a:cs typeface="Times New Roman" panose="02020603050405020304" pitchFamily="18" charset="0"/>
+              </a:rPr>
+              <a:t> </a:t>
+            </a:r>
+          </a:p>
+        </p:txBody>
+      </p:sp>
+      <p:sp>
+        <p:nvSpPr>
+          <p:cNvPr id="114" name="Google Shape;114;p15"/>
+          <p:cNvSpPr txBox="1"/>
+          <p:nvPr/>
+        </p:nvSpPr>
+        <p:spPr>
+          <a:xfrm>
+            <a:off x="1543050" y="3486150"/>
+            <a:ext cx="6172200" cy="571500"/>
+          </a:xfrm>
+          <a:prstGeom prst="rect">
+            <a:avLst/>
+          </a:prstGeom>
+          <a:noFill/>
+          <a:ln>
+            <a:noFill/>
+          </a:ln>
+        </p:spPr>
+        <p:txBody>
+          <a:bodyPr spcFirstLastPara="1" wrap="square" lIns="68569" tIns="34275" rIns="68569" bIns="34275" anchor="ctr" anchorCtr="0">
+            <a:normAutofit/>
+          </a:bodyPr>
+          <a:lstStyle/>
+          <a:p>
+            <a:pPr>
+              <a:buClr>
+                <a:schemeClr val="dk1"/>
+              </a:buClr>
+              <a:buSzPts val="3200"/>
+            </a:pPr>
+            <a:endParaRPr sz="2400">
+              <a:solidFill>
+                <a:schemeClr val="dk1"/>
+              </a:solidFill>
+              <a:latin typeface="Calibri"/>
+              <a:ea typeface="Calibri"/>
+              <a:cs typeface="Calibri"/>
+              <a:sym typeface="Calibri"/>
+            </a:endParaRPr>
+          </a:p>
+        </p:txBody>
+      </p:sp>
+    </p:spTree>
+    <p:extLst>
+      <p:ext uri="{BB962C8B-B14F-4D97-AF65-F5344CB8AC3E}">
+        <p14:creationId xmlns:p14="http://schemas.microsoft.com/office/powerpoint/2010/main" val="3435843968"/>
+      </p:ext>
+    </p:extLst>
+  </p:cSld>
+  <p:clrMapOvr>
+    <a:masterClrMapping/>
+  </p:clrMapOvr>
+</p:sld>
+</file>
+
+<file path=ppt/slides/slide4.xml><?xml version="1.0" encoding="utf-8"?>
+<p:sld xmlns:a="http://schemas.openxmlformats.org/drawingml/2006/main" xmlns:r="http://schemas.openxmlformats.org/officeDocument/2006/relationships" xmlns:p="http://schemas.openxmlformats.org/presentationml/2006/main">
+  <p:cSld>
+    <p:spTree>
+      <p:nvGrpSpPr>
+        <p:cNvPr id="1" name="Shape 108"/>
+        <p:cNvGrpSpPr/>
+        <p:nvPr/>
+      </p:nvGrpSpPr>
+      <p:grpSpPr>
+        <a:xfrm>
+          <a:off x="0" y="0"/>
+          <a:ext cx="0" cy="0"/>
+          <a:chOff x="0" y="0"/>
+          <a:chExt cx="0" cy="0"/>
+        </a:xfrm>
+      </p:grpSpPr>
+      <p:sp>
+        <p:nvSpPr>
+          <p:cNvPr id="109" name="Google Shape;109;p15"/>
+          <p:cNvSpPr txBox="1">
+            <a:spLocks noGrp="1"/>
+          </p:cNvSpPr>
+          <p:nvPr>
+            <p:ph type="title"/>
+          </p:nvPr>
+        </p:nvSpPr>
+        <p:spPr>
+          <a:xfrm>
+            <a:off x="1543050" y="367295"/>
+            <a:ext cx="6172200" cy="514350"/>
+          </a:xfrm>
+          <a:prstGeom prst="rect">
+            <a:avLst/>
+          </a:prstGeom>
+          <a:noFill/>
+          <a:ln>
+            <a:noFill/>
+          </a:ln>
+        </p:spPr>
+        <p:txBody>
+          <a:bodyPr spcFirstLastPara="1" vert="horz" wrap="square" lIns="68569" tIns="34275" rIns="68569" bIns="34275" rtlCol="0" anchor="ctr" anchorCtr="0">
+            <a:normAutofit/>
+          </a:bodyPr>
+          <a:lstStyle/>
+          <a:p>
+            <a:pPr algn="ctr">
+              <a:spcBef>
+                <a:spcPts val="0"/>
+              </a:spcBef>
+              <a:buClr>
+                <a:schemeClr val="dk1"/>
+              </a:buClr>
+              <a:buSzPts val="3200"/>
+            </a:pPr>
+            <a:r>
+              <a:rPr lang="en-US" sz="2400" b="1" dirty="0">
+                <a:latin typeface="Montserrat" panose="020B0604020202020204" charset="0"/>
+              </a:rPr>
+              <a:t>MOTIVATION</a:t>
+            </a:r>
+            <a:endParaRPr sz="2400" b="1" dirty="0">
+              <a:latin typeface="Montserrat" panose="020B0604020202020204" charset="0"/>
+            </a:endParaRPr>
+          </a:p>
+        </p:txBody>
+      </p:sp>
+      <p:sp>
+        <p:nvSpPr>
+          <p:cNvPr id="113" name="Google Shape;113;p15"/>
+          <p:cNvSpPr txBox="1"/>
+          <p:nvPr/>
+        </p:nvSpPr>
+        <p:spPr>
+          <a:xfrm>
+            <a:off x="1125431" y="1400493"/>
+            <a:ext cx="7007437" cy="2564024"/>
+          </a:xfrm>
+          <a:prstGeom prst="rect">
+            <a:avLst/>
+          </a:prstGeom>
+          <a:noFill/>
+          <a:ln>
+            <a:noFill/>
+          </a:ln>
+        </p:spPr>
+        <p:txBody>
+          <a:bodyPr spcFirstLastPara="1" wrap="square" lIns="68569" tIns="34275" rIns="68569" bIns="34275" anchor="t" anchorCtr="0">
+            <a:noAutofit/>
+          </a:bodyPr>
+          <a:lstStyle/>
+          <a:p>
+            <a:pPr algn="just"/>
+            <a:r>
+              <a:rPr lang="en-US" dirty="0"/>
+              <a:t>The motivation behind embarking on this project is multi-faceted, stemming from both personal and societal aspirations. As technology continues to shape our world, it becomes imperative to leverage its power to address pressing urban challenges like traffic problems. Here are some key reasons driving our enthusiasm for this </a:t>
+            </a:r>
+            <a:r>
+              <a:rPr lang="en-US" dirty="0" smtClean="0"/>
+              <a:t>project</a:t>
+            </a:r>
+          </a:p>
+          <a:p>
+            <a:pPr marL="285750" indent="-285750" algn="just">
+              <a:buFont typeface="Arial" panose="020B0604020202020204" pitchFamily="34" charset="0"/>
+              <a:buChar char="•"/>
+            </a:pPr>
+            <a:endParaRPr lang="en-US" dirty="0"/>
+          </a:p>
+          <a:p>
+            <a:pPr marL="285750" lvl="0" indent="-285750" algn="just">
+              <a:buFont typeface="Arial" panose="020B0604020202020204" pitchFamily="34" charset="0"/>
+              <a:buChar char="•"/>
+            </a:pPr>
+            <a:r>
+              <a:rPr lang="en-US" dirty="0"/>
+              <a:t>Exploration of AI and Applied Machine Learning: We're eager to delve into the world of AI and Machine Learning, particularly in computer vision and object detection, to address urban challenges like traffic issues</a:t>
+            </a:r>
+            <a:r>
+              <a:rPr lang="en-US" dirty="0" smtClean="0"/>
+              <a:t>.</a:t>
+            </a:r>
+          </a:p>
+          <a:p>
+            <a:pPr marL="285750" lvl="0" indent="-285750" algn="just">
+              <a:buFont typeface="Arial" panose="020B0604020202020204" pitchFamily="34" charset="0"/>
+              <a:buChar char="•"/>
+            </a:pPr>
+            <a:endParaRPr lang="en-US" dirty="0"/>
+          </a:p>
+          <a:p>
+            <a:pPr marL="285750" indent="-285750" algn="just">
+              <a:buFont typeface="Arial" panose="020B0604020202020204" pitchFamily="34" charset="0"/>
+              <a:buChar char="•"/>
+            </a:pPr>
+            <a:r>
+              <a:rPr lang="en-US" dirty="0"/>
+              <a:t>Real-world Application of Technical Skills: We aim to apply our theoretical knowledge in practical ways, using AI-based traffic management to make a meaningful impact on the lives of city residents.</a:t>
+            </a:r>
+            <a:endParaRPr lang="en-US" dirty="0">
+              <a:latin typeface="Times New Roman" panose="02020603050405020304" pitchFamily="18" charset="0"/>
+              <a:cs typeface="Times New Roman" panose="02020603050405020304" pitchFamily="18" charset="0"/>
+            </a:endParaRPr>
+          </a:p>
+        </p:txBody>
+      </p:sp>
+      <p:sp>
+        <p:nvSpPr>
+          <p:cNvPr id="114" name="Google Shape;114;p15"/>
+          <p:cNvSpPr txBox="1"/>
+          <p:nvPr/>
+        </p:nvSpPr>
+        <p:spPr>
+          <a:xfrm>
+            <a:off x="1543050" y="3486150"/>
+            <a:ext cx="6172200" cy="571500"/>
+          </a:xfrm>
+          <a:prstGeom prst="rect">
+            <a:avLst/>
+          </a:prstGeom>
+          <a:noFill/>
+          <a:ln>
+            <a:noFill/>
+          </a:ln>
+        </p:spPr>
+        <p:txBody>
+          <a:bodyPr spcFirstLastPara="1" wrap="square" lIns="68569" tIns="34275" rIns="68569" bIns="34275" anchor="ctr" anchorCtr="0">
+            <a:normAutofit/>
+          </a:bodyPr>
+          <a:lstStyle/>
+          <a:p>
+            <a:pPr>
+              <a:buClr>
+                <a:schemeClr val="dk1"/>
+              </a:buClr>
+              <a:buSzPts val="3200"/>
+            </a:pPr>
+            <a:endParaRPr sz="2400">
+              <a:solidFill>
+                <a:schemeClr val="dk1"/>
+              </a:solidFill>
+              <a:latin typeface="Calibri"/>
+              <a:ea typeface="Calibri"/>
+              <a:cs typeface="Calibri"/>
+              <a:sym typeface="Calibri"/>
+            </a:endParaRPr>
+          </a:p>
+        </p:txBody>
+      </p:sp>
+    </p:spTree>
+    <p:extLst>
+      <p:ext uri="{BB962C8B-B14F-4D97-AF65-F5344CB8AC3E}">
+        <p14:creationId xmlns:p14="http://schemas.microsoft.com/office/powerpoint/2010/main" val="1844443925"/>
+      </p:ext>
+    </p:extLst>
+  </p:cSld>
+  <p:clrMapOvr>
+    <a:masterClrMapping/>
+  </p:clrMapOvr>
+</p:sld>
+</file>
+
+<file path=ppt/slides/slide5.xml><?xml version="1.0" encoding="utf-8"?>
+<p:sld xmlns:a="http://schemas.openxmlformats.org/drawingml/2006/main" xmlns:r="http://schemas.openxmlformats.org/officeDocument/2006/relationships" xmlns:p="http://schemas.openxmlformats.org/presentationml/2006/main">
+  <p:cSld>
+    <p:spTree>
+      <p:nvGrpSpPr>
+        <p:cNvPr id="1" name="Shape 108"/>
+        <p:cNvGrpSpPr/>
+        <p:nvPr/>
+      </p:nvGrpSpPr>
+      <p:grpSpPr>
+        <a:xfrm>
+          <a:off x="0" y="0"/>
+          <a:ext cx="0" cy="0"/>
+          <a:chOff x="0" y="0"/>
+          <a:chExt cx="0" cy="0"/>
+        </a:xfrm>
+      </p:grpSpPr>
+      <p:sp>
+        <p:nvSpPr>
+          <p:cNvPr id="109" name="Google Shape;109;p15"/>
+          <p:cNvSpPr txBox="1">
+            <a:spLocks noGrp="1"/>
+          </p:cNvSpPr>
+          <p:nvPr>
+            <p:ph type="title"/>
+          </p:nvPr>
+        </p:nvSpPr>
+        <p:spPr>
+          <a:xfrm>
+            <a:off x="1543050" y="367295"/>
+            <a:ext cx="6172200" cy="514350"/>
+          </a:xfrm>
+          <a:prstGeom prst="rect">
+            <a:avLst/>
+          </a:prstGeom>
+          <a:noFill/>
+          <a:ln>
+            <a:noFill/>
+          </a:ln>
+        </p:spPr>
+        <p:txBody>
+          <a:bodyPr spcFirstLastPara="1" vert="horz" wrap="square" lIns="68569" tIns="34275" rIns="68569" bIns="34275" rtlCol="0" anchor="ctr" anchorCtr="0">
+            <a:normAutofit/>
+          </a:bodyPr>
+          <a:lstStyle/>
+          <a:p>
+            <a:pPr algn="ctr">
+              <a:spcBef>
+                <a:spcPts val="0"/>
+              </a:spcBef>
+              <a:buClr>
+                <a:schemeClr val="dk1"/>
+              </a:buClr>
+              <a:buSzPts val="3200"/>
+            </a:pPr>
+            <a:r>
+              <a:rPr lang="en-IN" sz="2400" b="1" dirty="0" smtClean="0">
+                <a:latin typeface="Montserrat" panose="020B0604020202020204" charset="0"/>
+              </a:rPr>
+              <a:t>PROBLEM DEFINATION</a:t>
+            </a:r>
+            <a:endParaRPr sz="2400" b="1" dirty="0">
+              <a:latin typeface="Montserrat" panose="020B0604020202020204" charset="0"/>
+            </a:endParaRPr>
+          </a:p>
+        </p:txBody>
+      </p:sp>
+      <p:sp>
+        <p:nvSpPr>
+          <p:cNvPr id="113" name="Google Shape;113;p15"/>
+          <p:cNvSpPr txBox="1"/>
+          <p:nvPr/>
+        </p:nvSpPr>
+        <p:spPr>
+          <a:xfrm>
+            <a:off x="1210098" y="2001626"/>
+            <a:ext cx="7007437" cy="1459547"/>
+          </a:xfrm>
+          <a:prstGeom prst="rect">
+            <a:avLst/>
+          </a:prstGeom>
+          <a:noFill/>
+          <a:ln>
+            <a:noFill/>
+          </a:ln>
+        </p:spPr>
+        <p:txBody>
+          <a:bodyPr spcFirstLastPara="1" wrap="square" lIns="68569" tIns="34275" rIns="68569" bIns="34275" anchor="t" anchorCtr="0">
+            <a:noAutofit/>
+          </a:bodyPr>
+          <a:lstStyle/>
+          <a:p>
+            <a:pPr algn="just"/>
+            <a:r>
+              <a:rPr lang="en-US" dirty="0"/>
+              <a:t>Developing a smart traffic management system </a:t>
+            </a:r>
+            <a:r>
+              <a:rPr lang="en-US" dirty="0" smtClean="0"/>
+              <a:t>to optimize </a:t>
+            </a:r>
+            <a:r>
+              <a:rPr lang="en-US" dirty="0"/>
+              <a:t>traffic </a:t>
+            </a:r>
+            <a:r>
+              <a:rPr lang="en-US" dirty="0" smtClean="0"/>
+              <a:t>flow, </a:t>
+            </a:r>
+            <a:r>
+              <a:rPr lang="en-US" dirty="0"/>
+              <a:t>while minimizing the travel time and maximizing mobility. The problem at hand is to design and implement a solution that effectively reduces traffic congestion. The solution should focus on minimizing </a:t>
+            </a:r>
+            <a:r>
+              <a:rPr lang="en-US" dirty="0" smtClean="0"/>
+              <a:t>traffic </a:t>
+            </a:r>
+            <a:r>
+              <a:rPr lang="en-US" dirty="0"/>
+              <a:t>delays, improving travel times, reducing environmental impact, and enhancing overall urban mobility</a:t>
+            </a:r>
+            <a:r>
+              <a:rPr lang="en-US" dirty="0" smtClean="0"/>
+              <a:t>. While making the system </a:t>
+            </a:r>
+            <a:r>
+              <a:rPr lang="en-IN" dirty="0" smtClean="0"/>
+              <a:t>practical</a:t>
+            </a:r>
+            <a:r>
+              <a:rPr lang="en-US" dirty="0" smtClean="0"/>
+              <a:t> to install on real traffic signals</a:t>
+            </a:r>
+            <a:endParaRPr lang="en-US" dirty="0"/>
+          </a:p>
+        </p:txBody>
+      </p:sp>
+    </p:spTree>
+    <p:extLst>
+      <p:ext uri="{BB962C8B-B14F-4D97-AF65-F5344CB8AC3E}">
+        <p14:creationId xmlns:p14="http://schemas.microsoft.com/office/powerpoint/2010/main" val="4111061722"/>
+      </p:ext>
+    </p:extLst>
+  </p:cSld>
+  <p:clrMapOvr>
+    <a:masterClrMapping/>
+  </p:clrMapOvr>
+</p:sld>
+</file>
+
+<file path=ppt/slides/slide6.xml><?xml version="1.0" encoding="utf-8"?>
+<p:sld xmlns:a="http://schemas.openxmlformats.org/drawingml/2006/main" xmlns:r="http://schemas.openxmlformats.org/officeDocument/2006/relationships" xmlns:p="http://schemas.openxmlformats.org/presentationml/2006/main">
+  <p:cSld>
+    <p:spTree>
+      <p:nvGrpSpPr>
+        <p:cNvPr id="1" name="Shape 108"/>
+        <p:cNvGrpSpPr/>
+        <p:nvPr/>
+      </p:nvGrpSpPr>
+      <p:grpSpPr>
+        <a:xfrm>
+          <a:off x="0" y="0"/>
+          <a:ext cx="0" cy="0"/>
+          <a:chOff x="0" y="0"/>
+          <a:chExt cx="0" cy="0"/>
+        </a:xfrm>
+      </p:grpSpPr>
+      <p:sp>
+        <p:nvSpPr>
+          <p:cNvPr id="109" name="Google Shape;109;p15"/>
+          <p:cNvSpPr txBox="1">
+            <a:spLocks noGrp="1"/>
+          </p:cNvSpPr>
+          <p:nvPr>
+            <p:ph type="title"/>
+          </p:nvPr>
+        </p:nvSpPr>
+        <p:spPr>
+          <a:xfrm>
+            <a:off x="1543050" y="367295"/>
+            <a:ext cx="6172200" cy="514350"/>
+          </a:xfrm>
+          <a:prstGeom prst="rect">
+            <a:avLst/>
+          </a:prstGeom>
+          <a:noFill/>
+          <a:ln>
+            <a:noFill/>
+          </a:ln>
+        </p:spPr>
+        <p:txBody>
+          <a:bodyPr spcFirstLastPara="1" vert="horz" wrap="square" lIns="68569" tIns="34275" rIns="68569" bIns="34275" rtlCol="0" anchor="ctr" anchorCtr="0">
+            <a:normAutofit/>
+          </a:bodyPr>
+          <a:lstStyle/>
+          <a:p>
+            <a:pPr algn="ctr">
+              <a:spcBef>
+                <a:spcPts val="0"/>
+              </a:spcBef>
+              <a:buClr>
+                <a:schemeClr val="dk1"/>
+              </a:buClr>
+              <a:buSzPts val="3200"/>
+            </a:pPr>
+            <a:r>
+              <a:rPr lang="en-IN" sz="2400" b="1" dirty="0" smtClean="0">
+                <a:latin typeface="Montserrat" panose="020B0604020202020204" charset="0"/>
+              </a:rPr>
+              <a:t>PROBLEM DEFINATION</a:t>
+            </a:r>
+            <a:endParaRPr sz="2400" b="1" dirty="0">
+              <a:latin typeface="Montserrat" panose="020B0604020202020204" charset="0"/>
+            </a:endParaRPr>
+          </a:p>
+        </p:txBody>
+      </p:sp>
+      <p:sp>
+        <p:nvSpPr>
+          <p:cNvPr id="113" name="Google Shape;113;p15"/>
+          <p:cNvSpPr txBox="1"/>
+          <p:nvPr/>
+        </p:nvSpPr>
+        <p:spPr>
+          <a:xfrm>
+            <a:off x="1210098" y="2001626"/>
+            <a:ext cx="7007437" cy="1459547"/>
+          </a:xfrm>
+          <a:prstGeom prst="rect">
+            <a:avLst/>
+          </a:prstGeom>
+          <a:noFill/>
+          <a:ln>
+            <a:noFill/>
+          </a:ln>
+        </p:spPr>
+        <p:txBody>
+          <a:bodyPr spcFirstLastPara="1" wrap="square" lIns="68569" tIns="34275" rIns="68569" bIns="34275" anchor="t" anchorCtr="0">
+            <a:noAutofit/>
+          </a:bodyPr>
+          <a:lstStyle/>
+          <a:p>
+            <a:pPr algn="just"/>
+            <a:r>
+              <a:rPr lang="en-US" dirty="0"/>
+              <a:t>Developing a smart traffic management system </a:t>
+            </a:r>
+            <a:r>
+              <a:rPr lang="en-US" dirty="0" smtClean="0"/>
+              <a:t>to optimize </a:t>
+            </a:r>
+            <a:r>
+              <a:rPr lang="en-US" dirty="0"/>
+              <a:t>traffic </a:t>
+            </a:r>
+            <a:r>
+              <a:rPr lang="en-US" dirty="0" smtClean="0"/>
+              <a:t>flow, </a:t>
+            </a:r>
+            <a:r>
+              <a:rPr lang="en-US" dirty="0"/>
+              <a:t>while minimizing the travel time and maximizing mobility. The problem at hand is to design and implement a solution that effectively reduces traffic congestion. The solution should focus on minimizing </a:t>
+            </a:r>
+            <a:r>
+              <a:rPr lang="en-US" dirty="0" smtClean="0"/>
+              <a:t>traffic </a:t>
+            </a:r>
+            <a:r>
+              <a:rPr lang="en-US" dirty="0"/>
+              <a:t>delays, improving travel times, reducing environmental impact, and enhancing overall urban mobility</a:t>
+            </a:r>
+            <a:r>
+              <a:rPr lang="en-US" dirty="0" smtClean="0"/>
+              <a:t>. While making the system </a:t>
+            </a:r>
+            <a:r>
+              <a:rPr lang="en-IN" dirty="0" smtClean="0"/>
+              <a:t>practical</a:t>
+            </a:r>
+            <a:r>
+              <a:rPr lang="en-US" dirty="0" smtClean="0"/>
+              <a:t> to install on real traffic signals</a:t>
+            </a:r>
+            <a:endParaRPr lang="en-US" dirty="0"/>
+          </a:p>
+        </p:txBody>
+      </p:sp>
+    </p:spTree>
+    <p:extLst>
+      <p:ext uri="{BB962C8B-B14F-4D97-AF65-F5344CB8AC3E}">
+        <p14:creationId xmlns:p14="http://schemas.microsoft.com/office/powerpoint/2010/main" val="1970704321"/>
+      </p:ext>
+    </p:extLst>
+  </p:cSld>
+  <p:clrMapOvr>
+    <a:masterClrMapping/>
+  </p:clrMapOvr>
+</p:sld>
+</file>
+
+<file path=ppt/slides/slide7.xml><?xml version="1.0" encoding="utf-8"?>
+<p:sld xmlns:a="http://schemas.openxmlformats.org/drawingml/2006/main" xmlns:r="http://schemas.openxmlformats.org/officeDocument/2006/relationships" xmlns:p="http://schemas.openxmlformats.org/presentationml/2006/main">
+  <p:cSld>
+    <p:spTree>
+      <p:nvGrpSpPr>
+        <p:cNvPr id="1" name="Shape 108"/>
+        <p:cNvGrpSpPr/>
+        <p:nvPr/>
+      </p:nvGrpSpPr>
+      <p:grpSpPr>
+        <a:xfrm>
+          <a:off x="0" y="0"/>
+          <a:ext cx="0" cy="0"/>
+          <a:chOff x="0" y="0"/>
+          <a:chExt cx="0" cy="0"/>
+        </a:xfrm>
+      </p:grpSpPr>
+      <p:sp>
+        <p:nvSpPr>
+          <p:cNvPr id="109" name="Google Shape;109;p15"/>
+          <p:cNvSpPr txBox="1">
+            <a:spLocks noGrp="1"/>
+          </p:cNvSpPr>
+          <p:nvPr>
+            <p:ph type="title"/>
+          </p:nvPr>
+        </p:nvSpPr>
+        <p:spPr>
+          <a:xfrm>
+            <a:off x="1543050" y="367295"/>
+            <a:ext cx="6172200" cy="514350"/>
+          </a:xfrm>
+          <a:prstGeom prst="rect">
+            <a:avLst/>
+          </a:prstGeom>
+          <a:noFill/>
+          <a:ln>
+            <a:noFill/>
+          </a:ln>
+        </p:spPr>
+        <p:txBody>
+          <a:bodyPr spcFirstLastPara="1" vert="horz" wrap="square" lIns="68569" tIns="34275" rIns="68569" bIns="34275" rtlCol="0" anchor="ctr" anchorCtr="0">
+            <a:normAutofit/>
+          </a:bodyPr>
+          <a:lstStyle/>
+          <a:p>
+            <a:pPr algn="ctr">
+              <a:spcBef>
+                <a:spcPts val="0"/>
+              </a:spcBef>
+              <a:buClr>
+                <a:schemeClr val="dk1"/>
+              </a:buClr>
+              <a:buSzPts val="3200"/>
+            </a:pPr>
+            <a:r>
+              <a:rPr lang="en-IN" sz="2400" b="1" dirty="0" smtClean="0">
+                <a:latin typeface="Montserrat" panose="020B0604020202020204" charset="0"/>
+              </a:rPr>
+              <a:t>OUR SOLUTION</a:t>
+            </a:r>
+            <a:endParaRPr sz="2400" b="1" dirty="0">
+              <a:latin typeface="Montserrat" panose="020B0604020202020204" charset="0"/>
+            </a:endParaRPr>
+          </a:p>
+        </p:txBody>
+      </p:sp>
+      <p:sp>
+        <p:nvSpPr>
+          <p:cNvPr id="113" name="Google Shape;113;p15"/>
+          <p:cNvSpPr txBox="1"/>
+          <p:nvPr/>
+        </p:nvSpPr>
+        <p:spPr>
+          <a:xfrm>
+            <a:off x="1210098" y="2001626"/>
+            <a:ext cx="7007437" cy="1459547"/>
+          </a:xfrm>
+          <a:prstGeom prst="rect">
+            <a:avLst/>
+          </a:prstGeom>
+          <a:noFill/>
+          <a:ln>
+            <a:noFill/>
+          </a:ln>
+        </p:spPr>
+        <p:txBody>
+          <a:bodyPr spcFirstLastPara="1" wrap="square" lIns="68569" tIns="34275" rIns="68569" bIns="34275" anchor="t" anchorCtr="0">
+            <a:noAutofit/>
+          </a:bodyPr>
+          <a:lstStyle/>
+          <a:p>
+            <a:pPr algn="just"/>
+            <a:endParaRPr lang="en-US" dirty="0"/>
+          </a:p>
+        </p:txBody>
+      </p:sp>
+    </p:spTree>
+    <p:extLst>
+      <p:ext uri="{BB962C8B-B14F-4D97-AF65-F5344CB8AC3E}">
+        <p14:creationId xmlns:p14="http://schemas.microsoft.com/office/powerpoint/2010/main" val="952469774"/>
+      </p:ext>
+    </p:extLst>
+  </p:cSld>
+  <p:clrMapOvr>
+    <a:masterClrMapping/>
+  </p:clrMapOvr>
+</p:sld>
+</file>
+
+<file path=ppt/slides/slide8.xml><?xml version="1.0" encoding="utf-8"?>
+<p:sld xmlns:a="http://schemas.openxmlformats.org/drawingml/2006/main" xmlns:r="http://schemas.openxmlformats.org/officeDocument/2006/relationships" xmlns:p="http://schemas.openxmlformats.org/presentationml/2006/main">
+  <p:cSld>
+    <p:spTree>
+      <p:nvGrpSpPr>
+        <p:cNvPr id="1" name="Shape 169"/>
+        <p:cNvGrpSpPr/>
+        <p:nvPr/>
+      </p:nvGrpSpPr>
+      <p:grpSpPr>
+        <a:xfrm>
+          <a:off x="0" y="0"/>
+          <a:ext cx="0" cy="0"/>
+          <a:chOff x="0" y="0"/>
+          <a:chExt cx="0" cy="0"/>
+        </a:xfrm>
+      </p:grpSpPr>
+      <p:sp>
+        <p:nvSpPr>
+          <p:cNvPr id="170" name="Google Shape;170;p21"/>
+          <p:cNvSpPr txBox="1">
+            <a:spLocks noGrp="1"/>
+          </p:cNvSpPr>
+          <p:nvPr>
+            <p:ph type="title"/>
+          </p:nvPr>
+        </p:nvSpPr>
+        <p:spPr>
+          <a:xfrm>
+            <a:off x="1428750" y="1543050"/>
+            <a:ext cx="6172200" cy="514350"/>
+          </a:xfrm>
+          <a:prstGeom prst="rect">
+            <a:avLst/>
+          </a:prstGeom>
+          <a:noFill/>
+          <a:ln>
+            <a:noFill/>
+          </a:ln>
+        </p:spPr>
+        <p:txBody>
+          <a:bodyPr spcFirstLastPara="1" vert="horz" wrap="square" lIns="68569" tIns="34275" rIns="68569" bIns="34275" rtlCol="0" anchor="ctr" anchorCtr="0">
+            <a:normAutofit/>
+          </a:bodyPr>
+          <a:lstStyle/>
+          <a:p>
+            <a:pPr algn="ctr">
+              <a:spcBef>
+                <a:spcPts val="0"/>
+              </a:spcBef>
+              <a:buClr>
+                <a:schemeClr val="dk1"/>
+              </a:buClr>
+              <a:buSzPts val="3200"/>
+            </a:pPr>
+            <a:r>
+              <a:rPr lang="en-US" sz="2400" dirty="0"/>
+              <a:t>          FLOW CHART	/ ALGORITHM</a:t>
+            </a:r>
+            <a:endParaRPr sz="2400" dirty="0"/>
+          </a:p>
+        </p:txBody>
+      </p:sp>
+      <p:sp>
+        <p:nvSpPr>
+          <p:cNvPr id="173" name="Google Shape;173;p21"/>
+          <p:cNvSpPr txBox="1">
+            <a:spLocks noGrp="1"/>
+          </p:cNvSpPr>
+          <p:nvPr>
+            <p:ph type="sldNum" idx="12"/>
+          </p:nvPr>
+        </p:nvSpPr>
+        <p:spPr>
+          <a:xfrm>
+            <a:off x="6057900" y="4767263"/>
+            <a:ext cx="1600200" cy="273844"/>
+          </a:xfrm>
+          <a:prstGeom prst="rect">
+            <a:avLst/>
+          </a:prstGeom>
+          <a:noFill/>
+          <a:ln>
+            <a:noFill/>
+          </a:ln>
+        </p:spPr>
+        <p:txBody>
+          <a:bodyPr spcFirstLastPara="1" vert="horz" wrap="square" lIns="68569" tIns="34275" rIns="68569" bIns="34275" rtlCol="0" anchor="ctr" anchorCtr="0">
+            <a:noAutofit/>
+          </a:bodyPr>
+          <a:lstStyle/>
+          <a:p>
+            <a:fld id="{00000000-1234-1234-1234-123412341234}" type="slidenum">
+              <a:rPr lang="en-US"/>
+              <a:pPr/>
+              <a:t>8</a:t>
+            </a:fld>
+            <a:endParaRPr/>
+          </a:p>
+        </p:txBody>
+      </p:sp>
+      <p:sp>
+        <p:nvSpPr>
+          <p:cNvPr id="174" name="Google Shape;174;p21"/>
+          <p:cNvSpPr txBox="1"/>
+          <p:nvPr/>
+        </p:nvSpPr>
+        <p:spPr>
+          <a:xfrm>
+            <a:off x="1485900" y="2286000"/>
+            <a:ext cx="6172200" cy="2343150"/>
+          </a:xfrm>
+          <a:prstGeom prst="rect">
+            <a:avLst/>
+          </a:prstGeom>
+          <a:noFill/>
+          <a:ln>
+            <a:noFill/>
+          </a:ln>
+        </p:spPr>
+        <p:txBody>
+          <a:bodyPr spcFirstLastPara="1" wrap="square" lIns="68569" tIns="34275" rIns="68569" bIns="34275" anchor="t" anchorCtr="0">
+            <a:normAutofit/>
+          </a:bodyPr>
+          <a:lstStyle/>
+          <a:p>
+            <a:pPr marL="257175" indent="-257175">
+              <a:buClr>
+                <a:schemeClr val="dk1"/>
+              </a:buClr>
+              <a:buSzPts val="3200"/>
+            </a:pPr>
+            <a:endParaRPr sz="2400">
+              <a:solidFill>
+                <a:schemeClr val="dk1"/>
+              </a:solidFill>
+              <a:latin typeface="Calibri"/>
+              <a:ea typeface="Calibri"/>
+              <a:cs typeface="Calibri"/>
+              <a:sym typeface="Calibri"/>
+            </a:endParaRPr>
+          </a:p>
+        </p:txBody>
+      </p:sp>
+      <p:sp>
+        <p:nvSpPr>
+          <p:cNvPr id="175" name="Google Shape;175;p21"/>
+          <p:cNvSpPr txBox="1"/>
+          <p:nvPr/>
+        </p:nvSpPr>
+        <p:spPr>
+          <a:xfrm>
+            <a:off x="1543050" y="3486150"/>
+            <a:ext cx="6172200" cy="571500"/>
+          </a:xfrm>
+          <a:prstGeom prst="rect">
+            <a:avLst/>
+          </a:prstGeom>
+          <a:noFill/>
+          <a:ln>
+            <a:noFill/>
+          </a:ln>
+        </p:spPr>
+        <p:txBody>
+          <a:bodyPr spcFirstLastPara="1" wrap="square" lIns="68569" tIns="34275" rIns="68569" bIns="34275" anchor="ctr" anchorCtr="0">
+            <a:normAutofit/>
+          </a:bodyPr>
+          <a:lstStyle/>
+          <a:p>
+            <a:pPr>
+              <a:buClr>
+                <a:schemeClr val="dk1"/>
+              </a:buClr>
+              <a:buSzPts val="3200"/>
+            </a:pPr>
+            <a:endParaRPr sz="2400">
+              <a:solidFill>
+                <a:schemeClr val="dk1"/>
+              </a:solidFill>
+              <a:latin typeface="Calibri"/>
+              <a:ea typeface="Calibri"/>
+              <a:cs typeface="Calibri"/>
+              <a:sym typeface="Calibri"/>
+            </a:endParaRPr>
+          </a:p>
+        </p:txBody>
+      </p:sp>
+      <p:pic>
+        <p:nvPicPr>
+          <p:cNvPr id="8" name="Picture 7" descr="C:\Users\KrupaShankari\Downloads\Revised_ISE_Logo.png"/>
+          <p:cNvPicPr/>
+          <p:nvPr/>
+        </p:nvPicPr>
+        <p:blipFill>
+          <a:blip r:embed="rId3" cstate="print">
+            <a:extLst>
+              <a:ext uri="{28A0092B-C50C-407E-A947-70E740481C1C}">
+                <a14:useLocalDpi xmlns:a14="http://schemas.microsoft.com/office/drawing/2010/main" val="0"/>
+              </a:ext>
+            </a:extLst>
+          </a:blip>
+          <a:srcRect/>
+          <a:stretch>
+            <a:fillRect/>
+          </a:stretch>
+        </p:blipFill>
+        <p:spPr bwMode="auto">
+          <a:xfrm>
+            <a:off x="1543929" y="321249"/>
+            <a:ext cx="6045591" cy="1113656"/>
+          </a:xfrm>
+          <a:prstGeom prst="rect">
+            <a:avLst/>
+          </a:prstGeom>
+          <a:noFill/>
+          <a:ln>
+            <a:noFill/>
+          </a:ln>
+        </p:spPr>
+      </p:pic>
+    </p:spTree>
+    <p:extLst>
+      <p:ext uri="{BB962C8B-B14F-4D97-AF65-F5344CB8AC3E}">
+        <p14:creationId xmlns:p14="http://schemas.microsoft.com/office/powerpoint/2010/main" val="1277506396"/>
+      </p:ext>
+    </p:extLst>
+  </p:cSld>
+  <p:clrMapOvr>
+    <a:masterClrMapping/>
+  </p:clrMapOvr>
+</p:sld>
+</file>
+
+<file path=ppt/slides/slide9.xml><?xml version="1.0" encoding="utf-8"?>
+<p:sld xmlns:a="http://schemas.openxmlformats.org/drawingml/2006/main" xmlns:r="http://schemas.openxmlformats.org/officeDocument/2006/relationships" xmlns:p="http://schemas.openxmlformats.org/presentationml/2006/main">
+  <p:cSld>
+    <p:spTree>
+      <p:nvGrpSpPr>
+        <p:cNvPr id="1" name="Shape 159"/>
+        <p:cNvGrpSpPr/>
+        <p:nvPr/>
+      </p:nvGrpSpPr>
+      <p:grpSpPr>
+        <a:xfrm>
+          <a:off x="0" y="0"/>
+          <a:ext cx="0" cy="0"/>
+          <a:chOff x="0" y="0"/>
+          <a:chExt cx="0" cy="0"/>
+        </a:xfrm>
+      </p:grpSpPr>
+      <p:sp>
+        <p:nvSpPr>
+          <p:cNvPr id="160" name="Google Shape;160;p20"/>
+          <p:cNvSpPr txBox="1">
+            <a:spLocks noGrp="1"/>
+          </p:cNvSpPr>
+          <p:nvPr>
+            <p:ph type="title"/>
+          </p:nvPr>
+        </p:nvSpPr>
+        <p:spPr>
+          <a:xfrm>
+            <a:off x="1428750" y="1543050"/>
+            <a:ext cx="6172200" cy="514350"/>
+          </a:xfrm>
+          <a:prstGeom prst="rect">
+            <a:avLst/>
+          </a:prstGeom>
+          <a:noFill/>
+          <a:ln>
+            <a:noFill/>
+          </a:ln>
+        </p:spPr>
+        <p:txBody>
+          <a:bodyPr spcFirstLastPara="1" vert="horz" wrap="square" lIns="68569" tIns="34275" rIns="68569" bIns="34275" rtlCol="0" anchor="ctr" anchorCtr="0">
+            <a:normAutofit/>
+          </a:bodyPr>
+          <a:lstStyle/>
+          <a:p>
+            <a:pPr algn="ctr">
+              <a:spcBef>
+                <a:spcPts val="0"/>
+              </a:spcBef>
+              <a:buClr>
+                <a:schemeClr val="dk1"/>
+              </a:buClr>
+              <a:buSzPts val="3200"/>
+            </a:pPr>
+            <a:r>
+              <a:rPr lang="en-US" sz="2400" dirty="0"/>
+              <a:t>      </a:t>
+            </a:r>
+            <a:r>
+              <a:rPr lang="en-US" sz="2400" dirty="0"/>
+              <a:t>RESULTS</a:t>
+            </a:r>
+            <a:r>
+              <a:rPr lang="en-US" sz="2400" dirty="0"/>
+              <a:t>	</a:t>
+            </a:r>
+            <a:endParaRPr sz="2400" dirty="0"/>
+          </a:p>
+        </p:txBody>
+      </p:sp>
+      <p:sp>
+        <p:nvSpPr>
+          <p:cNvPr id="163" name="Google Shape;163;p20"/>
+          <p:cNvSpPr txBox="1">
+            <a:spLocks noGrp="1"/>
+          </p:cNvSpPr>
+          <p:nvPr>
+            <p:ph type="sldNum" idx="12"/>
+          </p:nvPr>
+        </p:nvSpPr>
+        <p:spPr>
+          <a:xfrm>
+            <a:off x="6057900" y="4767263"/>
+            <a:ext cx="1600200" cy="273844"/>
+          </a:xfrm>
+          <a:prstGeom prst="rect">
+            <a:avLst/>
+          </a:prstGeom>
+          <a:noFill/>
+          <a:ln>
+            <a:noFill/>
+          </a:ln>
+        </p:spPr>
+        <p:txBody>
+          <a:bodyPr spcFirstLastPara="1" vert="horz" wrap="square" lIns="68569" tIns="34275" rIns="68569" bIns="34275" rtlCol="0" anchor="ctr" anchorCtr="0">
+            <a:noAutofit/>
+          </a:bodyPr>
+          <a:lstStyle/>
+          <a:p>
+            <a:fld id="{00000000-1234-1234-1234-123412341234}" type="slidenum">
+              <a:rPr lang="en-US"/>
+              <a:pPr/>
+              <a:t>9</a:t>
+            </a:fld>
+            <a:endParaRPr/>
+          </a:p>
+        </p:txBody>
+      </p:sp>
+      <p:sp>
+        <p:nvSpPr>
+          <p:cNvPr id="164" name="Google Shape;164;p20"/>
+          <p:cNvSpPr txBox="1"/>
+          <p:nvPr/>
+        </p:nvSpPr>
+        <p:spPr>
+          <a:xfrm>
+            <a:off x="1485900" y="2286000"/>
+            <a:ext cx="6172200" cy="2343150"/>
+          </a:xfrm>
+          <a:prstGeom prst="rect">
+            <a:avLst/>
+          </a:prstGeom>
+          <a:noFill/>
+          <a:ln>
+            <a:noFill/>
+          </a:ln>
+        </p:spPr>
+        <p:txBody>
+          <a:bodyPr spcFirstLastPara="1" wrap="square" lIns="68569" tIns="34275" rIns="68569" bIns="34275" anchor="t" anchorCtr="0">
+            <a:normAutofit/>
+          </a:bodyPr>
+          <a:lstStyle/>
+          <a:p>
+            <a:pPr marL="257175" indent="-257175">
+              <a:buClr>
+                <a:schemeClr val="dk1"/>
+              </a:buClr>
+              <a:buSzPts val="3200"/>
+            </a:pPr>
+            <a:endParaRPr sz="2400">
+              <a:solidFill>
+                <a:schemeClr val="dk1"/>
+              </a:solidFill>
+              <a:latin typeface="Calibri"/>
+              <a:ea typeface="Calibri"/>
+              <a:cs typeface="Calibri"/>
+              <a:sym typeface="Calibri"/>
+            </a:endParaRPr>
+          </a:p>
+        </p:txBody>
+      </p:sp>
+      <p:sp>
+        <p:nvSpPr>
+          <p:cNvPr id="165" name="Google Shape;165;p20"/>
+          <p:cNvSpPr txBox="1"/>
+          <p:nvPr/>
+        </p:nvSpPr>
+        <p:spPr>
+          <a:xfrm>
+            <a:off x="1543050" y="3486150"/>
+            <a:ext cx="6172200" cy="571500"/>
+          </a:xfrm>
+          <a:prstGeom prst="rect">
+            <a:avLst/>
+          </a:prstGeom>
+          <a:noFill/>
+          <a:ln>
+            <a:noFill/>
+          </a:ln>
+        </p:spPr>
+        <p:txBody>
+          <a:bodyPr spcFirstLastPara="1" wrap="square" lIns="68569" tIns="34275" rIns="68569" bIns="34275" anchor="ctr" anchorCtr="0">
+            <a:normAutofit/>
+          </a:bodyPr>
+          <a:lstStyle/>
+          <a:p>
+            <a:pPr>
+              <a:buClr>
+                <a:schemeClr val="dk1"/>
+              </a:buClr>
+              <a:buSzPts val="3200"/>
+            </a:pPr>
+            <a:endParaRPr sz="2400">
+              <a:solidFill>
+                <a:schemeClr val="dk1"/>
+              </a:solidFill>
+              <a:latin typeface="Calibri"/>
+              <a:ea typeface="Calibri"/>
+              <a:cs typeface="Calibri"/>
+              <a:sym typeface="Calibri"/>
+            </a:endParaRPr>
+          </a:p>
+        </p:txBody>
+      </p:sp>
+      <p:pic>
+        <p:nvPicPr>
+          <p:cNvPr id="8" name="Picture 7" descr="C:\Users\KrupaShankari\Downloads\Revised_ISE_Logo.png"/>
+          <p:cNvPicPr/>
+          <p:nvPr/>
+        </p:nvPicPr>
+        <p:blipFill>
+          <a:blip r:embed="rId3" cstate="print">
+            <a:extLst>
+              <a:ext uri="{28A0092B-C50C-407E-A947-70E740481C1C}">
+                <a14:useLocalDpi xmlns:a14="http://schemas.microsoft.com/office/drawing/2010/main" val="0"/>
+              </a:ext>
+            </a:extLst>
+          </a:blip>
+          <a:srcRect/>
+          <a:stretch>
+            <a:fillRect/>
+          </a:stretch>
+        </p:blipFill>
+        <p:spPr bwMode="auto">
+          <a:xfrm>
+            <a:off x="1543929" y="332491"/>
+            <a:ext cx="6045591" cy="1113656"/>
+          </a:xfrm>
+          <a:prstGeom prst="rect">
+            <a:avLst/>
+          </a:prstGeom>
+          <a:noFill/>
+          <a:ln>
+            <a:noFill/>
+          </a:ln>
+        </p:spPr>
+      </p:pic>
+    </p:spTree>
+    <p:extLst>
+      <p:ext uri="{BB962C8B-B14F-4D97-AF65-F5344CB8AC3E}">
+        <p14:creationId xmlns:p14="http://schemas.microsoft.com/office/powerpoint/2010/main" val="1211255944"/>
       </p:ext>
     </p:extLst>
   </p:cSld>

</xml_diff>